<commit_message>
RenderProps addition to day 5
</commit_message>
<xml_diff>
--- a/Day5/5-Patterns.pptx
+++ b/Day5/5-Patterns.pptx
@@ -5,10 +5,10 @@
     <p:sldMasterId id="2147483648" r:id="rId4"/>
   </p:sldMasterIdLst>
   <p:notesMasterIdLst>
-    <p:notesMasterId r:id="rId46"/>
+    <p:notesMasterId r:id="rId50"/>
   </p:notesMasterIdLst>
   <p:handoutMasterIdLst>
-    <p:handoutMasterId r:id="rId47"/>
+    <p:handoutMasterId r:id="rId51"/>
   </p:handoutMasterIdLst>
   <p:sldIdLst>
     <p:sldId id="256" r:id="rId5"/>
@@ -35,42 +35,46 @@
     <p:sldId id="1480" r:id="rId26"/>
     <p:sldId id="1481" r:id="rId27"/>
     <p:sldId id="1489" r:id="rId28"/>
-    <p:sldId id="1493" r:id="rId29"/>
-    <p:sldId id="1490" r:id="rId30"/>
-    <p:sldId id="1491" r:id="rId31"/>
-    <p:sldId id="1492" r:id="rId32"/>
-    <p:sldId id="1497" r:id="rId33"/>
-    <p:sldId id="1494" r:id="rId34"/>
-    <p:sldId id="1495" r:id="rId35"/>
-    <p:sldId id="1496" r:id="rId36"/>
-    <p:sldId id="1498" r:id="rId37"/>
-    <p:sldId id="1499" r:id="rId38"/>
-    <p:sldId id="1500" r:id="rId39"/>
-    <p:sldId id="1501" r:id="rId40"/>
-    <p:sldId id="1502" r:id="rId41"/>
-    <p:sldId id="1503" r:id="rId42"/>
-    <p:sldId id="1504" r:id="rId43"/>
-    <p:sldId id="1461" r:id="rId44"/>
-    <p:sldId id="1354" r:id="rId45"/>
+    <p:sldId id="1505" r:id="rId29"/>
+    <p:sldId id="1506" r:id="rId30"/>
+    <p:sldId id="1507" r:id="rId31"/>
+    <p:sldId id="1508" r:id="rId32"/>
+    <p:sldId id="1493" r:id="rId33"/>
+    <p:sldId id="1490" r:id="rId34"/>
+    <p:sldId id="1491" r:id="rId35"/>
+    <p:sldId id="1492" r:id="rId36"/>
+    <p:sldId id="1497" r:id="rId37"/>
+    <p:sldId id="1494" r:id="rId38"/>
+    <p:sldId id="1495" r:id="rId39"/>
+    <p:sldId id="1496" r:id="rId40"/>
+    <p:sldId id="1498" r:id="rId41"/>
+    <p:sldId id="1499" r:id="rId42"/>
+    <p:sldId id="1500" r:id="rId43"/>
+    <p:sldId id="1501" r:id="rId44"/>
+    <p:sldId id="1502" r:id="rId45"/>
+    <p:sldId id="1503" r:id="rId46"/>
+    <p:sldId id="1504" r:id="rId47"/>
+    <p:sldId id="1461" r:id="rId48"/>
+    <p:sldId id="1354" r:id="rId49"/>
   </p:sldIdLst>
   <p:sldSz cx="12192000" cy="6858000"/>
   <p:notesSz cx="6645275" cy="9775825"/>
   <p:embeddedFontLst>
     <p:embeddedFont>
       <p:font typeface="Montserrat" panose="00000500000000000000" pitchFamily="2" charset="0"/>
-      <p:regular r:id="rId48"/>
-      <p:bold r:id="rId49"/>
-      <p:italic r:id="rId50"/>
-      <p:boldItalic r:id="rId51"/>
+      <p:regular r:id="rId52"/>
+      <p:bold r:id="rId53"/>
+      <p:italic r:id="rId54"/>
+      <p:boldItalic r:id="rId55"/>
     </p:embeddedFont>
     <p:embeddedFont>
       <p:font typeface="Montserrat Black" panose="00000A00000000000000" pitchFamily="2" charset="0"/>
-      <p:bold r:id="rId52"/>
-      <p:boldItalic r:id="rId53"/>
+      <p:bold r:id="rId56"/>
+      <p:boldItalic r:id="rId57"/>
     </p:embeddedFont>
   </p:embeddedFontLst>
   <p:custDataLst>
-    <p:tags r:id="rId54"/>
+    <p:tags r:id="rId58"/>
   </p:custDataLst>
   <p:defaultTextStyle>
     <a:defPPr>
@@ -290,7 +294,7 @@
           <a:p>
             <a:fld id="{86D088FE-3E68-47FE-8BA4-634CD34BABBC}" type="datetimeFigureOut">
               <a:rPr lang="en-GB" smtClean="0"/>
-              <a:t>20/02/2024</a:t>
+              <a:t>11/12/2024</a:t>
             </a:fld>
             <a:endParaRPr lang="en-GB"/>
           </a:p>
@@ -460,7 +464,7 @@
             <a:fld id="{1D6B66C6-1E92-0F4E-A300-9D4ED1F0C23F}" type="datetimeFigureOut">
               <a:rPr lang="en-GB" smtClean="0"/>
               <a:pPr/>
-              <a:t>20/02/2024</a:t>
+              <a:t>11/12/2024</a:t>
             </a:fld>
             <a:endParaRPr lang="en-GB"/>
           </a:p>
@@ -1930,7 +1934,13 @@
   <p:cSld>
     <p:spTree>
       <p:nvGrpSpPr>
-        <p:cNvPr id="1" name=""/>
+        <p:cNvPr id="1" name="">
+          <a:extLst>
+            <a:ext uri="{FF2B5EF4-FFF2-40B4-BE49-F238E27FC236}">
+              <a16:creationId xmlns:a16="http://schemas.microsoft.com/office/drawing/2014/main" id="{8F0FD4B6-0BB8-3606-4EE7-FABA0D913507}"/>
+            </a:ext>
+          </a:extLst>
+        </p:cNvPr>
         <p:cNvGrpSpPr/>
         <p:nvPr/>
       </p:nvGrpSpPr>
@@ -1944,7 +1954,13 @@
       </p:grpSpPr>
       <p:sp>
         <p:nvSpPr>
-          <p:cNvPr id="2" name="Slide Image Placeholder 1"/>
+          <p:cNvPr id="2" name="Slide Image Placeholder 1">
+            <a:extLst>
+              <a:ext uri="{FF2B5EF4-FFF2-40B4-BE49-F238E27FC236}">
+                <a16:creationId xmlns:a16="http://schemas.microsoft.com/office/drawing/2014/main" id="{6BADDC28-A646-640D-55AC-BC3FFE9A9537}"/>
+              </a:ext>
+            </a:extLst>
+          </p:cNvPr>
           <p:cNvSpPr>
             <a:spLocks noGrp="1" noRot="1" noChangeAspect="1"/>
           </p:cNvSpPr>
@@ -1956,7 +1972,13 @@
       </p:sp>
       <p:sp>
         <p:nvSpPr>
-          <p:cNvPr id="3" name="Notes Placeholder 2"/>
+          <p:cNvPr id="3" name="Notes Placeholder 2">
+            <a:extLst>
+              <a:ext uri="{FF2B5EF4-FFF2-40B4-BE49-F238E27FC236}">
+                <a16:creationId xmlns:a16="http://schemas.microsoft.com/office/drawing/2014/main" id="{7D0493DC-A1DF-7766-975E-74FFB9CCDA26}"/>
+              </a:ext>
+            </a:extLst>
+          </p:cNvPr>
           <p:cNvSpPr>
             <a:spLocks noGrp="1"/>
           </p:cNvSpPr>
@@ -1969,52 +1991,19 @@
           <a:bodyPr/>
           <a:lstStyle/>
           <a:p>
-            <a:r>
-              <a:rPr lang="en-GB" dirty="0" err="1">
-                <a:hlinkClick r:id="rId3"/>
-              </a:rPr>
-              <a:t>Img</a:t>
-            </a:r>
-            <a:r>
-              <a:rPr lang="en-GB" dirty="0">
-                <a:hlinkClick r:id="rId3"/>
-              </a:rPr>
-              <a:t> - React </a:t>
-            </a:r>
-            <a:r>
-              <a:rPr lang="en-GB" dirty="0" err="1">
-                <a:hlinkClick r:id="rId3"/>
-              </a:rPr>
-              <a:t>useContext</a:t>
-            </a:r>
-            <a:r>
-              <a:rPr lang="en-GB" dirty="0">
-                <a:hlinkClick r:id="rId3"/>
-              </a:rPr>
-              <a:t>: The Best Way to Manage States - </a:t>
-            </a:r>
-            <a:r>
-              <a:rPr lang="en-GB" dirty="0" err="1">
-                <a:hlinkClick r:id="rId3"/>
-              </a:rPr>
-              <a:t>CopyCat</a:t>
-            </a:r>
-            <a:r>
-              <a:rPr lang="en-GB" dirty="0">
-                <a:hlinkClick r:id="rId3"/>
-              </a:rPr>
-              <a:t> Blog</a:t>
-            </a:r>
-            <a:r>
-              <a:rPr lang="en-GB" dirty="0"/>
-              <a:t> </a:t>
-            </a:r>
+            <a:endParaRPr lang="en-GB" dirty="0"/>
           </a:p>
         </p:txBody>
       </p:sp>
       <p:sp>
         <p:nvSpPr>
-          <p:cNvPr id="4" name="Slide Number Placeholder 3"/>
+          <p:cNvPr id="4" name="Slide Number Placeholder 3">
+            <a:extLst>
+              <a:ext uri="{FF2B5EF4-FFF2-40B4-BE49-F238E27FC236}">
+                <a16:creationId xmlns:a16="http://schemas.microsoft.com/office/drawing/2014/main" id="{DD2BFAC9-717B-C633-3B27-BF302EC947EF}"/>
+              </a:ext>
+            </a:extLst>
+          </p:cNvPr>
           <p:cNvSpPr>
             <a:spLocks noGrp="1"/>
           </p:cNvSpPr>
@@ -2039,7 +2028,7 @@
     </p:spTree>
     <p:extLst>
       <p:ext uri="{BB962C8B-B14F-4D97-AF65-F5344CB8AC3E}">
-        <p14:creationId xmlns:p14="http://schemas.microsoft.com/office/powerpoint/2010/main" val="3614073541"/>
+        <p14:creationId xmlns:p14="http://schemas.microsoft.com/office/powerpoint/2010/main" val="3687933953"/>
       </p:ext>
     </p:extLst>
   </p:cSld>
@@ -2054,7 +2043,13 @@
   <p:cSld>
     <p:spTree>
       <p:nvGrpSpPr>
-        <p:cNvPr id="1" name=""/>
+        <p:cNvPr id="1" name="">
+          <a:extLst>
+            <a:ext uri="{FF2B5EF4-FFF2-40B4-BE49-F238E27FC236}">
+              <a16:creationId xmlns:a16="http://schemas.microsoft.com/office/drawing/2014/main" id="{009B75C9-D8D3-A13F-9B47-30893DE2E665}"/>
+            </a:ext>
+          </a:extLst>
+        </p:cNvPr>
         <p:cNvGrpSpPr/>
         <p:nvPr/>
       </p:nvGrpSpPr>
@@ -2068,7 +2063,13 @@
       </p:grpSpPr>
       <p:sp>
         <p:nvSpPr>
-          <p:cNvPr id="2" name="Slide Image Placeholder 1"/>
+          <p:cNvPr id="2" name="Slide Image Placeholder 1">
+            <a:extLst>
+              <a:ext uri="{FF2B5EF4-FFF2-40B4-BE49-F238E27FC236}">
+                <a16:creationId xmlns:a16="http://schemas.microsoft.com/office/drawing/2014/main" id="{832C15F7-1711-A7F8-0DAE-AFDD5D8C8E61}"/>
+              </a:ext>
+            </a:extLst>
+          </p:cNvPr>
           <p:cNvSpPr>
             <a:spLocks noGrp="1" noRot="1" noChangeAspect="1"/>
           </p:cNvSpPr>
@@ -2080,7 +2081,13 @@
       </p:sp>
       <p:sp>
         <p:nvSpPr>
-          <p:cNvPr id="3" name="Notes Placeholder 2"/>
+          <p:cNvPr id="3" name="Notes Placeholder 2">
+            <a:extLst>
+              <a:ext uri="{FF2B5EF4-FFF2-40B4-BE49-F238E27FC236}">
+                <a16:creationId xmlns:a16="http://schemas.microsoft.com/office/drawing/2014/main" id="{000F650D-2A8C-BAA0-A856-B2CE4E827778}"/>
+              </a:ext>
+            </a:extLst>
+          </p:cNvPr>
           <p:cNvSpPr>
             <a:spLocks noGrp="1"/>
           </p:cNvSpPr>
@@ -2093,16 +2100,19 @@
           <a:bodyPr/>
           <a:lstStyle/>
           <a:p>
-            <a:r>
-              <a:rPr lang="en-GB" dirty="0"/>
-              <a:t>Provider and Consumer is a very important concept in React</a:t>
-            </a:r>
+            <a:endParaRPr lang="en-GB" dirty="0"/>
           </a:p>
         </p:txBody>
       </p:sp>
       <p:sp>
         <p:nvSpPr>
-          <p:cNvPr id="4" name="Slide Number Placeholder 3"/>
+          <p:cNvPr id="4" name="Slide Number Placeholder 3">
+            <a:extLst>
+              <a:ext uri="{FF2B5EF4-FFF2-40B4-BE49-F238E27FC236}">
+                <a16:creationId xmlns:a16="http://schemas.microsoft.com/office/drawing/2014/main" id="{0E0FDE2E-5880-1067-F51F-7434F4EF9968}"/>
+              </a:ext>
+            </a:extLst>
+          </p:cNvPr>
           <p:cNvSpPr>
             <a:spLocks noGrp="1"/>
           </p:cNvSpPr>
@@ -2127,7 +2137,7 @@
     </p:spTree>
     <p:extLst>
       <p:ext uri="{BB962C8B-B14F-4D97-AF65-F5344CB8AC3E}">
-        <p14:creationId xmlns:p14="http://schemas.microsoft.com/office/powerpoint/2010/main" val="2735822153"/>
+        <p14:creationId xmlns:p14="http://schemas.microsoft.com/office/powerpoint/2010/main" val="408312349"/>
       </p:ext>
     </p:extLst>
   </p:cSld>
@@ -2142,7 +2152,13 @@
   <p:cSld>
     <p:spTree>
       <p:nvGrpSpPr>
-        <p:cNvPr id="1" name=""/>
+        <p:cNvPr id="1" name="">
+          <a:extLst>
+            <a:ext uri="{FF2B5EF4-FFF2-40B4-BE49-F238E27FC236}">
+              <a16:creationId xmlns:a16="http://schemas.microsoft.com/office/drawing/2014/main" id="{E6637063-3B88-007E-ADB2-D46B49D0D5C6}"/>
+            </a:ext>
+          </a:extLst>
+        </p:cNvPr>
         <p:cNvGrpSpPr/>
         <p:nvPr/>
       </p:nvGrpSpPr>
@@ -2156,7 +2172,13 @@
       </p:grpSpPr>
       <p:sp>
         <p:nvSpPr>
-          <p:cNvPr id="2" name="Slide Image Placeholder 1"/>
+          <p:cNvPr id="2" name="Slide Image Placeholder 1">
+            <a:extLst>
+              <a:ext uri="{FF2B5EF4-FFF2-40B4-BE49-F238E27FC236}">
+                <a16:creationId xmlns:a16="http://schemas.microsoft.com/office/drawing/2014/main" id="{1B401C5D-9723-D75F-EC94-772888674748}"/>
+              </a:ext>
+            </a:extLst>
+          </p:cNvPr>
           <p:cNvSpPr>
             <a:spLocks noGrp="1" noRot="1" noChangeAspect="1"/>
           </p:cNvSpPr>
@@ -2168,7 +2190,13 @@
       </p:sp>
       <p:sp>
         <p:nvSpPr>
-          <p:cNvPr id="3" name="Notes Placeholder 2"/>
+          <p:cNvPr id="3" name="Notes Placeholder 2">
+            <a:extLst>
+              <a:ext uri="{FF2B5EF4-FFF2-40B4-BE49-F238E27FC236}">
+                <a16:creationId xmlns:a16="http://schemas.microsoft.com/office/drawing/2014/main" id="{64369C84-6446-0C6A-68F5-0B3FE103452B}"/>
+              </a:ext>
+            </a:extLst>
+          </p:cNvPr>
           <p:cNvSpPr>
             <a:spLocks noGrp="1"/>
           </p:cNvSpPr>
@@ -2187,7 +2215,13 @@
       </p:sp>
       <p:sp>
         <p:nvSpPr>
-          <p:cNvPr id="4" name="Slide Number Placeholder 3"/>
+          <p:cNvPr id="4" name="Slide Number Placeholder 3">
+            <a:extLst>
+              <a:ext uri="{FF2B5EF4-FFF2-40B4-BE49-F238E27FC236}">
+                <a16:creationId xmlns:a16="http://schemas.microsoft.com/office/drawing/2014/main" id="{E925BF2B-0664-F312-926E-C65435AEC47A}"/>
+              </a:ext>
+            </a:extLst>
+          </p:cNvPr>
           <p:cNvSpPr>
             <a:spLocks noGrp="1"/>
           </p:cNvSpPr>
@@ -2212,7 +2246,7 @@
     </p:spTree>
     <p:extLst>
       <p:ext uri="{BB962C8B-B14F-4D97-AF65-F5344CB8AC3E}">
-        <p14:creationId xmlns:p14="http://schemas.microsoft.com/office/powerpoint/2010/main" val="2468227868"/>
+        <p14:creationId xmlns:p14="http://schemas.microsoft.com/office/powerpoint/2010/main" val="1392792679"/>
       </p:ext>
     </p:extLst>
   </p:cSld>
@@ -2227,7 +2261,13 @@
   <p:cSld>
     <p:spTree>
       <p:nvGrpSpPr>
-        <p:cNvPr id="1" name=""/>
+        <p:cNvPr id="1" name="">
+          <a:extLst>
+            <a:ext uri="{FF2B5EF4-FFF2-40B4-BE49-F238E27FC236}">
+              <a16:creationId xmlns:a16="http://schemas.microsoft.com/office/drawing/2014/main" id="{5F16FBA5-D72E-53C1-D7D4-98DF955E56D9}"/>
+            </a:ext>
+          </a:extLst>
+        </p:cNvPr>
         <p:cNvGrpSpPr/>
         <p:nvPr/>
       </p:nvGrpSpPr>
@@ -2241,7 +2281,13 @@
       </p:grpSpPr>
       <p:sp>
         <p:nvSpPr>
-          <p:cNvPr id="2" name="Slide Image Placeholder 1"/>
+          <p:cNvPr id="2" name="Slide Image Placeholder 1">
+            <a:extLst>
+              <a:ext uri="{FF2B5EF4-FFF2-40B4-BE49-F238E27FC236}">
+                <a16:creationId xmlns:a16="http://schemas.microsoft.com/office/drawing/2014/main" id="{99C3E081-85BB-5D50-2EC2-58D51D004B7D}"/>
+              </a:ext>
+            </a:extLst>
+          </p:cNvPr>
           <p:cNvSpPr>
             <a:spLocks noGrp="1" noRot="1" noChangeAspect="1"/>
           </p:cNvSpPr>
@@ -2253,7 +2299,13 @@
       </p:sp>
       <p:sp>
         <p:nvSpPr>
-          <p:cNvPr id="3" name="Notes Placeholder 2"/>
+          <p:cNvPr id="3" name="Notes Placeholder 2">
+            <a:extLst>
+              <a:ext uri="{FF2B5EF4-FFF2-40B4-BE49-F238E27FC236}">
+                <a16:creationId xmlns:a16="http://schemas.microsoft.com/office/drawing/2014/main" id="{D3E7DA67-AC68-DC07-9CA5-99D33FABF15A}"/>
+              </a:ext>
+            </a:extLst>
+          </p:cNvPr>
           <p:cNvSpPr>
             <a:spLocks noGrp="1"/>
           </p:cNvSpPr>
@@ -2272,7 +2324,13 @@
       </p:sp>
       <p:sp>
         <p:nvSpPr>
-          <p:cNvPr id="4" name="Slide Number Placeholder 3"/>
+          <p:cNvPr id="4" name="Slide Number Placeholder 3">
+            <a:extLst>
+              <a:ext uri="{FF2B5EF4-FFF2-40B4-BE49-F238E27FC236}">
+                <a16:creationId xmlns:a16="http://schemas.microsoft.com/office/drawing/2014/main" id="{67E862D1-EE39-1FB8-E717-6D5BAED2CC82}"/>
+              </a:ext>
+            </a:extLst>
+          </p:cNvPr>
           <p:cNvSpPr>
             <a:spLocks noGrp="1"/>
           </p:cNvSpPr>
@@ -2297,7 +2355,7 @@
     </p:spTree>
     <p:extLst>
       <p:ext uri="{BB962C8B-B14F-4D97-AF65-F5344CB8AC3E}">
-        <p14:creationId xmlns:p14="http://schemas.microsoft.com/office/powerpoint/2010/main" val="614858422"/>
+        <p14:creationId xmlns:p14="http://schemas.microsoft.com/office/powerpoint/2010/main" val="3891047857"/>
       </p:ext>
     </p:extLst>
   </p:cSld>
@@ -2351,7 +2409,46 @@
           <a:bodyPr/>
           <a:lstStyle/>
           <a:p>
-            <a:endParaRPr lang="en-GB" dirty="0"/>
+            <a:r>
+              <a:rPr lang="en-GB" dirty="0" err="1">
+                <a:hlinkClick r:id="rId3"/>
+              </a:rPr>
+              <a:t>Img</a:t>
+            </a:r>
+            <a:r>
+              <a:rPr lang="en-GB" dirty="0">
+                <a:hlinkClick r:id="rId3"/>
+              </a:rPr>
+              <a:t> - React </a:t>
+            </a:r>
+            <a:r>
+              <a:rPr lang="en-GB" dirty="0" err="1">
+                <a:hlinkClick r:id="rId3"/>
+              </a:rPr>
+              <a:t>useContext</a:t>
+            </a:r>
+            <a:r>
+              <a:rPr lang="en-GB" dirty="0">
+                <a:hlinkClick r:id="rId3"/>
+              </a:rPr>
+              <a:t>: The Best Way to Manage States - </a:t>
+            </a:r>
+            <a:r>
+              <a:rPr lang="en-GB" dirty="0" err="1">
+                <a:hlinkClick r:id="rId3"/>
+              </a:rPr>
+              <a:t>CopyCat</a:t>
+            </a:r>
+            <a:r>
+              <a:rPr lang="en-GB" dirty="0">
+                <a:hlinkClick r:id="rId3"/>
+              </a:rPr>
+              <a:t> Blog</a:t>
+            </a:r>
+            <a:r>
+              <a:rPr lang="en-GB" dirty="0"/>
+              <a:t> </a:t>
+            </a:r>
           </a:p>
         </p:txBody>
       </p:sp>
@@ -2382,7 +2479,7 @@
     </p:spTree>
     <p:extLst>
       <p:ext uri="{BB962C8B-B14F-4D97-AF65-F5344CB8AC3E}">
-        <p14:creationId xmlns:p14="http://schemas.microsoft.com/office/powerpoint/2010/main" val="2480226261"/>
+        <p14:creationId xmlns:p14="http://schemas.microsoft.com/office/powerpoint/2010/main" val="3614073541"/>
       </p:ext>
     </p:extLst>
   </p:cSld>
@@ -2436,7 +2533,10 @@
           <a:bodyPr/>
           <a:lstStyle/>
           <a:p>
-            <a:endParaRPr lang="en-GB" dirty="0"/>
+            <a:r>
+              <a:rPr lang="en-GB" dirty="0"/>
+              <a:t>Provider and Consumer is a very important concept in React</a:t>
+            </a:r>
           </a:p>
         </p:txBody>
       </p:sp>
@@ -2467,7 +2567,7 @@
     </p:spTree>
     <p:extLst>
       <p:ext uri="{BB962C8B-B14F-4D97-AF65-F5344CB8AC3E}">
-        <p14:creationId xmlns:p14="http://schemas.microsoft.com/office/powerpoint/2010/main" val="2074738758"/>
+        <p14:creationId xmlns:p14="http://schemas.microsoft.com/office/powerpoint/2010/main" val="2735822153"/>
       </p:ext>
     </p:extLst>
   </p:cSld>
@@ -2552,7 +2652,7 @@
     </p:spTree>
     <p:extLst>
       <p:ext uri="{BB962C8B-B14F-4D97-AF65-F5344CB8AC3E}">
-        <p14:creationId xmlns:p14="http://schemas.microsoft.com/office/powerpoint/2010/main" val="3476490449"/>
+        <p14:creationId xmlns:p14="http://schemas.microsoft.com/office/powerpoint/2010/main" val="2468227868"/>
       </p:ext>
     </p:extLst>
   </p:cSld>
@@ -2637,7 +2737,7 @@
     </p:spTree>
     <p:extLst>
       <p:ext uri="{BB962C8B-B14F-4D97-AF65-F5344CB8AC3E}">
-        <p14:creationId xmlns:p14="http://schemas.microsoft.com/office/powerpoint/2010/main" val="2710617241"/>
+        <p14:creationId xmlns:p14="http://schemas.microsoft.com/office/powerpoint/2010/main" val="614858422"/>
       </p:ext>
     </p:extLst>
   </p:cSld>
@@ -2733,6 +2833,346 @@
 </file>
 
 <file path=ppt/notesSlides/notesSlide30.xml><?xml version="1.0" encoding="utf-8"?>
+<p:notes xmlns:a="http://schemas.openxmlformats.org/drawingml/2006/main" xmlns:r="http://schemas.openxmlformats.org/officeDocument/2006/relationships" xmlns:p="http://schemas.openxmlformats.org/presentationml/2006/main">
+  <p:cSld>
+    <p:spTree>
+      <p:nvGrpSpPr>
+        <p:cNvPr id="1" name=""/>
+        <p:cNvGrpSpPr/>
+        <p:nvPr/>
+      </p:nvGrpSpPr>
+      <p:grpSpPr>
+        <a:xfrm>
+          <a:off x="0" y="0"/>
+          <a:ext cx="0" cy="0"/>
+          <a:chOff x="0" y="0"/>
+          <a:chExt cx="0" cy="0"/>
+        </a:xfrm>
+      </p:grpSpPr>
+      <p:sp>
+        <p:nvSpPr>
+          <p:cNvPr id="2" name="Slide Image Placeholder 1"/>
+          <p:cNvSpPr>
+            <a:spLocks noGrp="1" noRot="1" noChangeAspect="1"/>
+          </p:cNvSpPr>
+          <p:nvPr>
+            <p:ph type="sldImg"/>
+          </p:nvPr>
+        </p:nvSpPr>
+        <p:spPr/>
+      </p:sp>
+      <p:sp>
+        <p:nvSpPr>
+          <p:cNvPr id="3" name="Notes Placeholder 2"/>
+          <p:cNvSpPr>
+            <a:spLocks noGrp="1"/>
+          </p:cNvSpPr>
+          <p:nvPr>
+            <p:ph type="body" idx="1"/>
+          </p:nvPr>
+        </p:nvSpPr>
+        <p:spPr/>
+        <p:txBody>
+          <a:bodyPr/>
+          <a:lstStyle/>
+          <a:p>
+            <a:endParaRPr lang="en-GB" dirty="0"/>
+          </a:p>
+        </p:txBody>
+      </p:sp>
+      <p:sp>
+        <p:nvSpPr>
+          <p:cNvPr id="4" name="Slide Number Placeholder 3"/>
+          <p:cNvSpPr>
+            <a:spLocks noGrp="1"/>
+          </p:cNvSpPr>
+          <p:nvPr>
+            <p:ph type="sldNum" sz="quarter" idx="5"/>
+          </p:nvPr>
+        </p:nvSpPr>
+        <p:spPr/>
+        <p:txBody>
+          <a:bodyPr/>
+          <a:lstStyle/>
+          <a:p>
+            <a:fld id="{548901C6-1DA1-FB44-ABEE-06A0FEB7738E}" type="slidenum">
+              <a:rPr lang="en-GB" smtClean="0"/>
+              <a:pPr/>
+              <a:t>33</a:t>
+            </a:fld>
+            <a:endParaRPr lang="en-GB"/>
+          </a:p>
+        </p:txBody>
+      </p:sp>
+    </p:spTree>
+    <p:extLst>
+      <p:ext uri="{BB962C8B-B14F-4D97-AF65-F5344CB8AC3E}">
+        <p14:creationId xmlns:p14="http://schemas.microsoft.com/office/powerpoint/2010/main" val="2480226261"/>
+      </p:ext>
+    </p:extLst>
+  </p:cSld>
+  <p:clrMapOvr>
+    <a:masterClrMapping/>
+  </p:clrMapOvr>
+</p:notes>
+</file>
+
+<file path=ppt/notesSlides/notesSlide31.xml><?xml version="1.0" encoding="utf-8"?>
+<p:notes xmlns:a="http://schemas.openxmlformats.org/drawingml/2006/main" xmlns:r="http://schemas.openxmlformats.org/officeDocument/2006/relationships" xmlns:p="http://schemas.openxmlformats.org/presentationml/2006/main">
+  <p:cSld>
+    <p:spTree>
+      <p:nvGrpSpPr>
+        <p:cNvPr id="1" name=""/>
+        <p:cNvGrpSpPr/>
+        <p:nvPr/>
+      </p:nvGrpSpPr>
+      <p:grpSpPr>
+        <a:xfrm>
+          <a:off x="0" y="0"/>
+          <a:ext cx="0" cy="0"/>
+          <a:chOff x="0" y="0"/>
+          <a:chExt cx="0" cy="0"/>
+        </a:xfrm>
+      </p:grpSpPr>
+      <p:sp>
+        <p:nvSpPr>
+          <p:cNvPr id="2" name="Slide Image Placeholder 1"/>
+          <p:cNvSpPr>
+            <a:spLocks noGrp="1" noRot="1" noChangeAspect="1"/>
+          </p:cNvSpPr>
+          <p:nvPr>
+            <p:ph type="sldImg"/>
+          </p:nvPr>
+        </p:nvSpPr>
+        <p:spPr/>
+      </p:sp>
+      <p:sp>
+        <p:nvSpPr>
+          <p:cNvPr id="3" name="Notes Placeholder 2"/>
+          <p:cNvSpPr>
+            <a:spLocks noGrp="1"/>
+          </p:cNvSpPr>
+          <p:nvPr>
+            <p:ph type="body" idx="1"/>
+          </p:nvPr>
+        </p:nvSpPr>
+        <p:spPr/>
+        <p:txBody>
+          <a:bodyPr/>
+          <a:lstStyle/>
+          <a:p>
+            <a:endParaRPr lang="en-GB" dirty="0"/>
+          </a:p>
+        </p:txBody>
+      </p:sp>
+      <p:sp>
+        <p:nvSpPr>
+          <p:cNvPr id="4" name="Slide Number Placeholder 3"/>
+          <p:cNvSpPr>
+            <a:spLocks noGrp="1"/>
+          </p:cNvSpPr>
+          <p:nvPr>
+            <p:ph type="sldNum" sz="quarter" idx="5"/>
+          </p:nvPr>
+        </p:nvSpPr>
+        <p:spPr/>
+        <p:txBody>
+          <a:bodyPr/>
+          <a:lstStyle/>
+          <a:p>
+            <a:fld id="{548901C6-1DA1-FB44-ABEE-06A0FEB7738E}" type="slidenum">
+              <a:rPr lang="en-GB" smtClean="0"/>
+              <a:pPr/>
+              <a:t>34</a:t>
+            </a:fld>
+            <a:endParaRPr lang="en-GB"/>
+          </a:p>
+        </p:txBody>
+      </p:sp>
+    </p:spTree>
+    <p:extLst>
+      <p:ext uri="{BB962C8B-B14F-4D97-AF65-F5344CB8AC3E}">
+        <p14:creationId xmlns:p14="http://schemas.microsoft.com/office/powerpoint/2010/main" val="2074738758"/>
+      </p:ext>
+    </p:extLst>
+  </p:cSld>
+  <p:clrMapOvr>
+    <a:masterClrMapping/>
+  </p:clrMapOvr>
+</p:notes>
+</file>
+
+<file path=ppt/notesSlides/notesSlide32.xml><?xml version="1.0" encoding="utf-8"?>
+<p:notes xmlns:a="http://schemas.openxmlformats.org/drawingml/2006/main" xmlns:r="http://schemas.openxmlformats.org/officeDocument/2006/relationships" xmlns:p="http://schemas.openxmlformats.org/presentationml/2006/main">
+  <p:cSld>
+    <p:spTree>
+      <p:nvGrpSpPr>
+        <p:cNvPr id="1" name=""/>
+        <p:cNvGrpSpPr/>
+        <p:nvPr/>
+      </p:nvGrpSpPr>
+      <p:grpSpPr>
+        <a:xfrm>
+          <a:off x="0" y="0"/>
+          <a:ext cx="0" cy="0"/>
+          <a:chOff x="0" y="0"/>
+          <a:chExt cx="0" cy="0"/>
+        </a:xfrm>
+      </p:grpSpPr>
+      <p:sp>
+        <p:nvSpPr>
+          <p:cNvPr id="2" name="Slide Image Placeholder 1"/>
+          <p:cNvSpPr>
+            <a:spLocks noGrp="1" noRot="1" noChangeAspect="1"/>
+          </p:cNvSpPr>
+          <p:nvPr>
+            <p:ph type="sldImg"/>
+          </p:nvPr>
+        </p:nvSpPr>
+        <p:spPr/>
+      </p:sp>
+      <p:sp>
+        <p:nvSpPr>
+          <p:cNvPr id="3" name="Notes Placeholder 2"/>
+          <p:cNvSpPr>
+            <a:spLocks noGrp="1"/>
+          </p:cNvSpPr>
+          <p:nvPr>
+            <p:ph type="body" idx="1"/>
+          </p:nvPr>
+        </p:nvSpPr>
+        <p:spPr/>
+        <p:txBody>
+          <a:bodyPr/>
+          <a:lstStyle/>
+          <a:p>
+            <a:endParaRPr lang="en-GB" dirty="0"/>
+          </a:p>
+        </p:txBody>
+      </p:sp>
+      <p:sp>
+        <p:nvSpPr>
+          <p:cNvPr id="4" name="Slide Number Placeholder 3"/>
+          <p:cNvSpPr>
+            <a:spLocks noGrp="1"/>
+          </p:cNvSpPr>
+          <p:nvPr>
+            <p:ph type="sldNum" sz="quarter" idx="5"/>
+          </p:nvPr>
+        </p:nvSpPr>
+        <p:spPr/>
+        <p:txBody>
+          <a:bodyPr/>
+          <a:lstStyle/>
+          <a:p>
+            <a:fld id="{548901C6-1DA1-FB44-ABEE-06A0FEB7738E}" type="slidenum">
+              <a:rPr lang="en-GB" smtClean="0"/>
+              <a:pPr/>
+              <a:t>35</a:t>
+            </a:fld>
+            <a:endParaRPr lang="en-GB"/>
+          </a:p>
+        </p:txBody>
+      </p:sp>
+    </p:spTree>
+    <p:extLst>
+      <p:ext uri="{BB962C8B-B14F-4D97-AF65-F5344CB8AC3E}">
+        <p14:creationId xmlns:p14="http://schemas.microsoft.com/office/powerpoint/2010/main" val="3476490449"/>
+      </p:ext>
+    </p:extLst>
+  </p:cSld>
+  <p:clrMapOvr>
+    <a:masterClrMapping/>
+  </p:clrMapOvr>
+</p:notes>
+</file>
+
+<file path=ppt/notesSlides/notesSlide33.xml><?xml version="1.0" encoding="utf-8"?>
+<p:notes xmlns:a="http://schemas.openxmlformats.org/drawingml/2006/main" xmlns:r="http://schemas.openxmlformats.org/officeDocument/2006/relationships" xmlns:p="http://schemas.openxmlformats.org/presentationml/2006/main">
+  <p:cSld>
+    <p:spTree>
+      <p:nvGrpSpPr>
+        <p:cNvPr id="1" name=""/>
+        <p:cNvGrpSpPr/>
+        <p:nvPr/>
+      </p:nvGrpSpPr>
+      <p:grpSpPr>
+        <a:xfrm>
+          <a:off x="0" y="0"/>
+          <a:ext cx="0" cy="0"/>
+          <a:chOff x="0" y="0"/>
+          <a:chExt cx="0" cy="0"/>
+        </a:xfrm>
+      </p:grpSpPr>
+      <p:sp>
+        <p:nvSpPr>
+          <p:cNvPr id="2" name="Slide Image Placeholder 1"/>
+          <p:cNvSpPr>
+            <a:spLocks noGrp="1" noRot="1" noChangeAspect="1"/>
+          </p:cNvSpPr>
+          <p:nvPr>
+            <p:ph type="sldImg"/>
+          </p:nvPr>
+        </p:nvSpPr>
+        <p:spPr/>
+      </p:sp>
+      <p:sp>
+        <p:nvSpPr>
+          <p:cNvPr id="3" name="Notes Placeholder 2"/>
+          <p:cNvSpPr>
+            <a:spLocks noGrp="1"/>
+          </p:cNvSpPr>
+          <p:nvPr>
+            <p:ph type="body" idx="1"/>
+          </p:nvPr>
+        </p:nvSpPr>
+        <p:spPr/>
+        <p:txBody>
+          <a:bodyPr/>
+          <a:lstStyle/>
+          <a:p>
+            <a:endParaRPr lang="en-GB" dirty="0"/>
+          </a:p>
+        </p:txBody>
+      </p:sp>
+      <p:sp>
+        <p:nvSpPr>
+          <p:cNvPr id="4" name="Slide Number Placeholder 3"/>
+          <p:cNvSpPr>
+            <a:spLocks noGrp="1"/>
+          </p:cNvSpPr>
+          <p:nvPr>
+            <p:ph type="sldNum" sz="quarter" idx="5"/>
+          </p:nvPr>
+        </p:nvSpPr>
+        <p:spPr/>
+        <p:txBody>
+          <a:bodyPr/>
+          <a:lstStyle/>
+          <a:p>
+            <a:fld id="{548901C6-1DA1-FB44-ABEE-06A0FEB7738E}" type="slidenum">
+              <a:rPr lang="en-GB" smtClean="0"/>
+              <a:pPr/>
+              <a:t>36</a:t>
+            </a:fld>
+            <a:endParaRPr lang="en-GB"/>
+          </a:p>
+        </p:txBody>
+      </p:sp>
+    </p:spTree>
+    <p:extLst>
+      <p:ext uri="{BB962C8B-B14F-4D97-AF65-F5344CB8AC3E}">
+        <p14:creationId xmlns:p14="http://schemas.microsoft.com/office/powerpoint/2010/main" val="2710617241"/>
+      </p:ext>
+    </p:extLst>
+  </p:cSld>
+  <p:clrMapOvr>
+    <a:masterClrMapping/>
+  </p:clrMapOvr>
+</p:notes>
+</file>
+
+<file path=ppt/notesSlides/notesSlide34.xml><?xml version="1.0" encoding="utf-8"?>
 <p:notes xmlns:a="http://schemas.openxmlformats.org/drawingml/2006/main" xmlns:r="http://schemas.openxmlformats.org/officeDocument/2006/relationships" xmlns:p="http://schemas.openxmlformats.org/presentationml/2006/main">
   <p:cSld>
     <p:spTree>
@@ -2822,7 +3262,7 @@
             <a:fld id="{548901C6-1DA1-FB44-ABEE-06A0FEB7738E}" type="slidenum">
               <a:rPr lang="en-GB" smtClean="0"/>
               <a:pPr/>
-              <a:t>34</a:t>
+              <a:t>38</a:t>
             </a:fld>
             <a:endParaRPr lang="en-GB"/>
           </a:p>
@@ -2841,7 +3281,7 @@
 </p:notes>
 </file>
 
-<file path=ppt/notesSlides/notesSlide31.xml><?xml version="1.0" encoding="utf-8"?>
+<file path=ppt/notesSlides/notesSlide35.xml><?xml version="1.0" encoding="utf-8"?>
 <p:notes xmlns:a="http://schemas.openxmlformats.org/drawingml/2006/main" xmlns:r="http://schemas.openxmlformats.org/officeDocument/2006/relationships" xmlns:p="http://schemas.openxmlformats.org/presentationml/2006/main">
   <p:cSld>
     <p:spTree>
@@ -3001,7 +3441,7 @@
             <a:fld id="{548901C6-1DA1-FB44-ABEE-06A0FEB7738E}" type="slidenum">
               <a:rPr lang="en-GB" smtClean="0"/>
               <a:pPr/>
-              <a:t>35</a:t>
+              <a:t>39</a:t>
             </a:fld>
             <a:endParaRPr lang="en-GB"/>
           </a:p>
@@ -3020,7 +3460,7 @@
 </p:notes>
 </file>
 
-<file path=ppt/notesSlides/notesSlide32.xml><?xml version="1.0" encoding="utf-8"?>
+<file path=ppt/notesSlides/notesSlide36.xml><?xml version="1.0" encoding="utf-8"?>
 <p:notes xmlns:a="http://schemas.openxmlformats.org/drawingml/2006/main" xmlns:r="http://schemas.openxmlformats.org/officeDocument/2006/relationships" xmlns:p="http://schemas.openxmlformats.org/presentationml/2006/main">
   <p:cSld>
     <p:spTree>
@@ -3180,7 +3620,7 @@
             <a:fld id="{548901C6-1DA1-FB44-ABEE-06A0FEB7738E}" type="slidenum">
               <a:rPr lang="en-GB" smtClean="0"/>
               <a:pPr/>
-              <a:t>36</a:t>
+              <a:t>40</a:t>
             </a:fld>
             <a:endParaRPr lang="en-GB"/>
           </a:p>
@@ -3199,7 +3639,7 @@
 </p:notes>
 </file>
 
-<file path=ppt/notesSlides/notesSlide33.xml><?xml version="1.0" encoding="utf-8"?>
+<file path=ppt/notesSlides/notesSlide37.xml><?xml version="1.0" encoding="utf-8"?>
 <p:notes xmlns:a="http://schemas.openxmlformats.org/drawingml/2006/main" xmlns:r="http://schemas.openxmlformats.org/officeDocument/2006/relationships" xmlns:p="http://schemas.openxmlformats.org/presentationml/2006/main">
   <p:cSld>
     <p:spTree>
@@ -3319,7 +3759,7 @@
             <a:fld id="{548901C6-1DA1-FB44-ABEE-06A0FEB7738E}" type="slidenum">
               <a:rPr lang="en-GB" smtClean="0"/>
               <a:pPr/>
-              <a:t>37</a:t>
+              <a:t>41</a:t>
             </a:fld>
             <a:endParaRPr lang="en-GB"/>
           </a:p>
@@ -3338,7 +3778,7 @@
 </p:notes>
 </file>
 
-<file path=ppt/notesSlides/notesSlide34.xml><?xml version="1.0" encoding="utf-8"?>
+<file path=ppt/notesSlides/notesSlide38.xml><?xml version="1.0" encoding="utf-8"?>
 <p:notes xmlns:a="http://schemas.openxmlformats.org/drawingml/2006/main" xmlns:r="http://schemas.openxmlformats.org/officeDocument/2006/relationships" xmlns:p="http://schemas.openxmlformats.org/presentationml/2006/main">
   <p:cSld>
     <p:spTree>
@@ -3458,7 +3898,7 @@
             <a:fld id="{548901C6-1DA1-FB44-ABEE-06A0FEB7738E}" type="slidenum">
               <a:rPr lang="en-GB" smtClean="0"/>
               <a:pPr/>
-              <a:t>38</a:t>
+              <a:t>42</a:t>
             </a:fld>
             <a:endParaRPr lang="en-GB"/>
           </a:p>
@@ -3477,7 +3917,7 @@
 </p:notes>
 </file>
 
-<file path=ppt/notesSlides/notesSlide35.xml><?xml version="1.0" encoding="utf-8"?>
+<file path=ppt/notesSlides/notesSlide39.xml><?xml version="1.0" encoding="utf-8"?>
 <p:notes xmlns:a="http://schemas.openxmlformats.org/drawingml/2006/main" xmlns:r="http://schemas.openxmlformats.org/officeDocument/2006/relationships" xmlns:p="http://schemas.openxmlformats.org/presentationml/2006/main">
   <p:cSld>
     <p:spTree>
@@ -3585,7 +4025,7 @@
             <a:fld id="{548901C6-1DA1-FB44-ABEE-06A0FEB7738E}" type="slidenum">
               <a:rPr lang="en-GB" smtClean="0"/>
               <a:pPr/>
-              <a:t>39</a:t>
+              <a:t>43</a:t>
             </a:fld>
             <a:endParaRPr lang="en-GB"/>
           </a:p>
@@ -3595,119 +4035,6 @@
     <p:extLst>
       <p:ext uri="{BB962C8B-B14F-4D97-AF65-F5344CB8AC3E}">
         <p14:creationId xmlns:p14="http://schemas.microsoft.com/office/powerpoint/2010/main" val="2715179918"/>
-      </p:ext>
-    </p:extLst>
-  </p:cSld>
-  <p:clrMapOvr>
-    <a:masterClrMapping/>
-  </p:clrMapOvr>
-</p:notes>
-</file>
-
-<file path=ppt/notesSlides/notesSlide36.xml><?xml version="1.0" encoding="utf-8"?>
-<p:notes xmlns:a="http://schemas.openxmlformats.org/drawingml/2006/main" xmlns:r="http://schemas.openxmlformats.org/officeDocument/2006/relationships" xmlns:p="http://schemas.openxmlformats.org/presentationml/2006/main">
-  <p:cSld>
-    <p:spTree>
-      <p:nvGrpSpPr>
-        <p:cNvPr id="1" name=""/>
-        <p:cNvGrpSpPr/>
-        <p:nvPr/>
-      </p:nvGrpSpPr>
-      <p:grpSpPr>
-        <a:xfrm>
-          <a:off x="0" y="0"/>
-          <a:ext cx="0" cy="0"/>
-          <a:chOff x="0" y="0"/>
-          <a:chExt cx="0" cy="0"/>
-        </a:xfrm>
-      </p:grpSpPr>
-      <p:sp>
-        <p:nvSpPr>
-          <p:cNvPr id="2" name="Slide Image Placeholder 1"/>
-          <p:cNvSpPr>
-            <a:spLocks noGrp="1" noRot="1" noChangeAspect="1"/>
-          </p:cNvSpPr>
-          <p:nvPr>
-            <p:ph type="sldImg"/>
-          </p:nvPr>
-        </p:nvSpPr>
-        <p:spPr/>
-      </p:sp>
-      <p:sp>
-        <p:nvSpPr>
-          <p:cNvPr id="3" name="Notes Placeholder 2"/>
-          <p:cNvSpPr>
-            <a:spLocks noGrp="1"/>
-          </p:cNvSpPr>
-          <p:nvPr>
-            <p:ph type="body" idx="1"/>
-          </p:nvPr>
-        </p:nvSpPr>
-        <p:spPr/>
-        <p:txBody>
-          <a:bodyPr/>
-          <a:lstStyle/>
-          <a:p>
-            <a:r>
-              <a:rPr lang="en-GB" dirty="0"/>
-              <a:t>Pluto (QA Estate Agent repo): </a:t>
-            </a:r>
-            <a:r>
-              <a:rPr lang="en-GB" dirty="0" err="1">
-                <a:hlinkClick r:id="rId3"/>
-              </a:rPr>
-              <a:t>AndySmithQA</a:t>
-            </a:r>
-            <a:r>
-              <a:rPr lang="en-GB" dirty="0">
-                <a:hlinkClick r:id="rId3"/>
-              </a:rPr>
-              <a:t>/</a:t>
-            </a:r>
-            <a:r>
-              <a:rPr lang="en-GB" dirty="0" err="1">
-                <a:hlinkClick r:id="rId3"/>
-              </a:rPr>
-              <a:t>QAEstate</a:t>
-            </a:r>
-            <a:r>
-              <a:rPr lang="en-GB" dirty="0">
-                <a:hlinkClick r:id="rId3"/>
-              </a:rPr>
-              <a:t> (github.com)</a:t>
-            </a:r>
-            <a:endParaRPr lang="en-GB" dirty="0"/>
-          </a:p>
-        </p:txBody>
-      </p:sp>
-      <p:sp>
-        <p:nvSpPr>
-          <p:cNvPr id="4" name="Slide Number Placeholder 3"/>
-          <p:cNvSpPr>
-            <a:spLocks noGrp="1"/>
-          </p:cNvSpPr>
-          <p:nvPr>
-            <p:ph type="sldNum" sz="quarter" idx="5"/>
-          </p:nvPr>
-        </p:nvSpPr>
-        <p:spPr/>
-        <p:txBody>
-          <a:bodyPr/>
-          <a:lstStyle/>
-          <a:p>
-            <a:fld id="{548901C6-1DA1-FB44-ABEE-06A0FEB7738E}" type="slidenum">
-              <a:rPr lang="en-GB" smtClean="0"/>
-              <a:pPr/>
-              <a:t>41</a:t>
-            </a:fld>
-            <a:endParaRPr lang="en-GB"/>
-          </a:p>
-        </p:txBody>
-      </p:sp>
-    </p:spTree>
-    <p:extLst>
-      <p:ext uri="{BB962C8B-B14F-4D97-AF65-F5344CB8AC3E}">
-        <p14:creationId xmlns:p14="http://schemas.microsoft.com/office/powerpoint/2010/main" val="473843897"/>
       </p:ext>
     </p:extLst>
   </p:cSld>
@@ -3793,6 +4120,119 @@
     <p:extLst>
       <p:ext uri="{BB962C8B-B14F-4D97-AF65-F5344CB8AC3E}">
         <p14:creationId xmlns:p14="http://schemas.microsoft.com/office/powerpoint/2010/main" val="3185691578"/>
+      </p:ext>
+    </p:extLst>
+  </p:cSld>
+  <p:clrMapOvr>
+    <a:masterClrMapping/>
+  </p:clrMapOvr>
+</p:notes>
+</file>
+
+<file path=ppt/notesSlides/notesSlide40.xml><?xml version="1.0" encoding="utf-8"?>
+<p:notes xmlns:a="http://schemas.openxmlformats.org/drawingml/2006/main" xmlns:r="http://schemas.openxmlformats.org/officeDocument/2006/relationships" xmlns:p="http://schemas.openxmlformats.org/presentationml/2006/main">
+  <p:cSld>
+    <p:spTree>
+      <p:nvGrpSpPr>
+        <p:cNvPr id="1" name=""/>
+        <p:cNvGrpSpPr/>
+        <p:nvPr/>
+      </p:nvGrpSpPr>
+      <p:grpSpPr>
+        <a:xfrm>
+          <a:off x="0" y="0"/>
+          <a:ext cx="0" cy="0"/>
+          <a:chOff x="0" y="0"/>
+          <a:chExt cx="0" cy="0"/>
+        </a:xfrm>
+      </p:grpSpPr>
+      <p:sp>
+        <p:nvSpPr>
+          <p:cNvPr id="2" name="Slide Image Placeholder 1"/>
+          <p:cNvSpPr>
+            <a:spLocks noGrp="1" noRot="1" noChangeAspect="1"/>
+          </p:cNvSpPr>
+          <p:nvPr>
+            <p:ph type="sldImg"/>
+          </p:nvPr>
+        </p:nvSpPr>
+        <p:spPr/>
+      </p:sp>
+      <p:sp>
+        <p:nvSpPr>
+          <p:cNvPr id="3" name="Notes Placeholder 2"/>
+          <p:cNvSpPr>
+            <a:spLocks noGrp="1"/>
+          </p:cNvSpPr>
+          <p:nvPr>
+            <p:ph type="body" idx="1"/>
+          </p:nvPr>
+        </p:nvSpPr>
+        <p:spPr/>
+        <p:txBody>
+          <a:bodyPr/>
+          <a:lstStyle/>
+          <a:p>
+            <a:r>
+              <a:rPr lang="en-GB" dirty="0"/>
+              <a:t>Pluto (QA Estate Agent repo): </a:t>
+            </a:r>
+            <a:r>
+              <a:rPr lang="en-GB" dirty="0" err="1">
+                <a:hlinkClick r:id="rId3"/>
+              </a:rPr>
+              <a:t>AndySmithQA</a:t>
+            </a:r>
+            <a:r>
+              <a:rPr lang="en-GB" dirty="0">
+                <a:hlinkClick r:id="rId3"/>
+              </a:rPr>
+              <a:t>/</a:t>
+            </a:r>
+            <a:r>
+              <a:rPr lang="en-GB" dirty="0" err="1">
+                <a:hlinkClick r:id="rId3"/>
+              </a:rPr>
+              <a:t>QAEstate</a:t>
+            </a:r>
+            <a:r>
+              <a:rPr lang="en-GB" dirty="0">
+                <a:hlinkClick r:id="rId3"/>
+              </a:rPr>
+              <a:t> (github.com)</a:t>
+            </a:r>
+            <a:endParaRPr lang="en-GB" dirty="0"/>
+          </a:p>
+        </p:txBody>
+      </p:sp>
+      <p:sp>
+        <p:nvSpPr>
+          <p:cNvPr id="4" name="Slide Number Placeholder 3"/>
+          <p:cNvSpPr>
+            <a:spLocks noGrp="1"/>
+          </p:cNvSpPr>
+          <p:nvPr>
+            <p:ph type="sldNum" sz="quarter" idx="5"/>
+          </p:nvPr>
+        </p:nvSpPr>
+        <p:spPr/>
+        <p:txBody>
+          <a:bodyPr/>
+          <a:lstStyle/>
+          <a:p>
+            <a:fld id="{548901C6-1DA1-FB44-ABEE-06A0FEB7738E}" type="slidenum">
+              <a:rPr lang="en-GB" smtClean="0"/>
+              <a:pPr/>
+              <a:t>45</a:t>
+            </a:fld>
+            <a:endParaRPr lang="en-GB"/>
+          </a:p>
+        </p:txBody>
+      </p:sp>
+    </p:spTree>
+    <p:extLst>
+      <p:ext uri="{BB962C8B-B14F-4D97-AF65-F5344CB8AC3E}">
+        <p14:creationId xmlns:p14="http://schemas.microsoft.com/office/powerpoint/2010/main" val="473843897"/>
       </p:ext>
     </p:extLst>
   </p:cSld>
@@ -36670,8 +37110,8 @@
         </p:nvSpPr>
         <p:spPr>
           <a:xfrm>
-            <a:off x="5842454" y="434107"/>
-            <a:ext cx="5621513" cy="2165093"/>
+            <a:off x="6027649" y="804714"/>
+            <a:ext cx="5621513" cy="4175993"/>
           </a:xfrm>
           <a:prstGeom prst="rect">
             <a:avLst/>
@@ -36873,7 +37313,7 @@
           <a:p>
             <a:r>
               <a:rPr lang="en-GB" dirty="0"/>
-              <a:t>This has been used heavily this week and today already. </a:t>
+              <a:t>We have become used to passing data into a component call via props this week.</a:t>
             </a:r>
           </a:p>
           <a:p>
@@ -36882,37 +37322,8 @@
           <a:p>
             <a:r>
               <a:rPr lang="en-GB" dirty="0"/>
-              <a:t>Passing values into the component call is simply known as the render props pattern, where we display what is passed to us.</a:t>
+              <a:t>Render props is a pattern in React that allows you to share code between components using a prop whose value is a function. This function is used to tell a component what to render.</a:t>
             </a:r>
-          </a:p>
-          <a:p>
-            <a:endParaRPr lang="en-GB" dirty="0"/>
-          </a:p>
-          <a:p>
-            <a:r>
-              <a:rPr lang="en-GB" dirty="0"/>
-              <a:t>This has been extended greatly with the passing and de-structuring of maps and external data sets.</a:t>
-            </a:r>
-          </a:p>
-          <a:p>
-            <a:endParaRPr lang="en-GB" dirty="0"/>
-          </a:p>
-          <a:p>
-            <a:r>
-              <a:rPr lang="en-GB" dirty="0"/>
-              <a:t>The </a:t>
-            </a:r>
-            <a:r>
-              <a:rPr lang="en-GB" dirty="0" err="1"/>
-              <a:t>deconstructure</a:t>
-            </a:r>
-            <a:r>
-              <a:rPr lang="en-GB" dirty="0"/>
-              <a:t> of JSON data is part of the Render Props Pattern</a:t>
-            </a:r>
-          </a:p>
-          <a:p>
-            <a:endParaRPr lang="en-GB" dirty="0"/>
           </a:p>
           <a:p>
             <a:endParaRPr lang="en-GB" dirty="0"/>
@@ -36945,6 +37356,1587 @@
 </file>
 
 <file path=ppt/slides/slide25.xml><?xml version="1.0" encoding="utf-8"?>
+<p:sld xmlns:a="http://schemas.openxmlformats.org/drawingml/2006/main" xmlns:r="http://schemas.openxmlformats.org/officeDocument/2006/relationships" xmlns:p="http://schemas.openxmlformats.org/presentationml/2006/main">
+  <p:cSld>
+    <p:spTree>
+      <p:nvGrpSpPr>
+        <p:cNvPr id="1" name="">
+          <a:extLst>
+            <a:ext uri="{FF2B5EF4-FFF2-40B4-BE49-F238E27FC236}">
+              <a16:creationId xmlns:a16="http://schemas.microsoft.com/office/drawing/2014/main" id="{0AD615D0-DBC5-89E9-8806-E51810E70ADC}"/>
+            </a:ext>
+          </a:extLst>
+        </p:cNvPr>
+        <p:cNvGrpSpPr/>
+        <p:nvPr/>
+      </p:nvGrpSpPr>
+      <p:grpSpPr>
+        <a:xfrm>
+          <a:off x="0" y="0"/>
+          <a:ext cx="0" cy="0"/>
+          <a:chOff x="0" y="0"/>
+          <a:chExt cx="0" cy="0"/>
+        </a:xfrm>
+      </p:grpSpPr>
+      <p:sp>
+        <p:nvSpPr>
+          <p:cNvPr id="2" name="Text Placeholder 1">
+            <a:extLst>
+              <a:ext uri="{FF2B5EF4-FFF2-40B4-BE49-F238E27FC236}">
+                <a16:creationId xmlns:a16="http://schemas.microsoft.com/office/drawing/2014/main" id="{7912BA0D-77D8-557A-6756-87B75AF51C78}"/>
+              </a:ext>
+            </a:extLst>
+          </p:cNvPr>
+          <p:cNvSpPr>
+            <a:spLocks noGrp="1"/>
+          </p:cNvSpPr>
+          <p:nvPr>
+            <p:ph type="body" sz="quarter" idx="10"/>
+          </p:nvPr>
+        </p:nvSpPr>
+        <p:spPr>
+          <a:xfrm>
+            <a:off x="375629" y="2744921"/>
+            <a:ext cx="3694112" cy="730876"/>
+          </a:xfrm>
+        </p:spPr>
+        <p:txBody>
+          <a:bodyPr/>
+          <a:lstStyle/>
+          <a:p>
+            <a:r>
+              <a:rPr lang="en-GB" dirty="0"/>
+              <a:t>Render Props Pattern</a:t>
+            </a:r>
+          </a:p>
+        </p:txBody>
+      </p:sp>
+      <p:sp>
+        <p:nvSpPr>
+          <p:cNvPr id="4" name="Slide Number Placeholder 3">
+            <a:extLst>
+              <a:ext uri="{FF2B5EF4-FFF2-40B4-BE49-F238E27FC236}">
+                <a16:creationId xmlns:a16="http://schemas.microsoft.com/office/drawing/2014/main" id="{703585EB-FD0E-ED38-2114-2BEE141E741E}"/>
+              </a:ext>
+            </a:extLst>
+          </p:cNvPr>
+          <p:cNvSpPr>
+            <a:spLocks noGrp="1"/>
+          </p:cNvSpPr>
+          <p:nvPr>
+            <p:ph type="sldNum" sz="quarter" idx="4"/>
+          </p:nvPr>
+        </p:nvSpPr>
+        <p:spPr/>
+        <p:txBody>
+          <a:bodyPr/>
+          <a:lstStyle/>
+          <a:p>
+            <a:fld id="{EF892D59-8F09-EF4B-AD6D-DA609442F868}" type="slidenum">
+              <a:rPr lang="en-GB" smtClean="0"/>
+              <a:pPr/>
+              <a:t>25</a:t>
+            </a:fld>
+            <a:endParaRPr lang="en-GB" dirty="0"/>
+          </a:p>
+        </p:txBody>
+      </p:sp>
+      <p:pic>
+        <p:nvPicPr>
+          <p:cNvPr id="6" name="Picture 5">
+            <a:extLst>
+              <a:ext uri="{FF2B5EF4-FFF2-40B4-BE49-F238E27FC236}">
+                <a16:creationId xmlns:a16="http://schemas.microsoft.com/office/drawing/2014/main" id="{FF60CF70-4564-9FB1-0A62-1603340CEC8E}"/>
+              </a:ext>
+            </a:extLst>
+          </p:cNvPr>
+          <p:cNvPicPr>
+            <a:picLocks noChangeAspect="1"/>
+          </p:cNvPicPr>
+          <p:nvPr/>
+        </p:nvPicPr>
+        <p:blipFill>
+          <a:blip r:embed="rId3"/>
+          <a:stretch>
+            <a:fillRect/>
+          </a:stretch>
+        </p:blipFill>
+        <p:spPr>
+          <a:xfrm>
+            <a:off x="3390400" y="1444299"/>
+            <a:ext cx="3804259" cy="2896821"/>
+          </a:xfrm>
+          <a:prstGeom prst="rect">
+            <a:avLst/>
+          </a:prstGeom>
+        </p:spPr>
+      </p:pic>
+      <p:sp>
+        <p:nvSpPr>
+          <p:cNvPr id="7" name="Text Placeholder 5">
+            <a:extLst>
+              <a:ext uri="{FF2B5EF4-FFF2-40B4-BE49-F238E27FC236}">
+                <a16:creationId xmlns:a16="http://schemas.microsoft.com/office/drawing/2014/main" id="{9877F424-EAEC-D9E3-806A-A844989AB59E}"/>
+              </a:ext>
+            </a:extLst>
+          </p:cNvPr>
+          <p:cNvSpPr txBox="1">
+            <a:spLocks/>
+          </p:cNvSpPr>
+          <p:nvPr/>
+        </p:nvSpPr>
+        <p:spPr>
+          <a:xfrm>
+            <a:off x="6027649" y="804714"/>
+            <a:ext cx="5621513" cy="4175993"/>
+          </a:xfrm>
+          <a:prstGeom prst="rect">
+            <a:avLst/>
+          </a:prstGeom>
+        </p:spPr>
+        <p:txBody>
+          <a:bodyPr vert="horz" lIns="0" tIns="0" rIns="0" bIns="0" rtlCol="0" anchor="t" anchorCtr="0">
+            <a:noAutofit/>
+          </a:bodyPr>
+          <a:lstStyle>
+            <a:lvl1pPr marL="0" indent="0" algn="l" defTabSz="914400" rtl="0" eaLnBrk="1" latinLnBrk="0" hangingPunct="1">
+              <a:lnSpc>
+                <a:spcPct val="100000"/>
+              </a:lnSpc>
+              <a:spcBef>
+                <a:spcPts val="0"/>
+              </a:spcBef>
+              <a:spcAft>
+                <a:spcPts val="650"/>
+              </a:spcAft>
+              <a:buSzPct val="115000"/>
+              <a:buFont typeface="Arial" panose="020B0604020202020204" pitchFamily="34" charset="0"/>
+              <a:buNone/>
+              <a:defRPr sz="2000" b="0" i="0" kern="1200">
+                <a:solidFill>
+                  <a:schemeClr val="tx1"/>
+                </a:solidFill>
+                <a:latin typeface="Montserrat" pitchFamily="2" charset="77"/>
+                <a:ea typeface="+mn-ea"/>
+                <a:cs typeface="+mn-cs"/>
+              </a:defRPr>
+            </a:lvl1pPr>
+            <a:lvl2pPr marL="180000" marR="0" indent="-180000" algn="l" defTabSz="914400" rtl="0" eaLnBrk="1" fontAlgn="auto" latinLnBrk="0" hangingPunct="1">
+              <a:lnSpc>
+                <a:spcPct val="100000"/>
+              </a:lnSpc>
+              <a:spcBef>
+                <a:spcPts val="0"/>
+              </a:spcBef>
+              <a:spcAft>
+                <a:spcPts val="1200"/>
+              </a:spcAft>
+              <a:buClrTx/>
+              <a:buSzPct val="125000"/>
+              <a:buFont typeface="Arial" panose="020B0604020202020204" pitchFamily="34" charset="0"/>
+              <a:buChar char="•"/>
+              <a:tabLst/>
+              <a:defRPr sz="2000" b="0" kern="1200">
+                <a:solidFill>
+                  <a:schemeClr val="tx1"/>
+                </a:solidFill>
+                <a:latin typeface="Montserrat" pitchFamily="2" charset="77"/>
+                <a:ea typeface="+mn-ea"/>
+                <a:cs typeface="+mn-cs"/>
+              </a:defRPr>
+            </a:lvl2pPr>
+            <a:lvl3pPr marL="180000" indent="-180000" algn="l" defTabSz="914400" rtl="0" eaLnBrk="1" latinLnBrk="0" hangingPunct="1">
+              <a:lnSpc>
+                <a:spcPct val="100000"/>
+              </a:lnSpc>
+              <a:spcBef>
+                <a:spcPts val="0"/>
+              </a:spcBef>
+              <a:spcAft>
+                <a:spcPts val="650"/>
+              </a:spcAft>
+              <a:buSzPct val="120000"/>
+              <a:buFont typeface="Arial" panose="020B0604020202020204" pitchFamily="34" charset="0"/>
+              <a:buChar char="•"/>
+              <a:tabLst/>
+              <a:defRPr sz="2000" b="0" i="0" kern="1200">
+                <a:solidFill>
+                  <a:schemeClr val="tx1"/>
+                </a:solidFill>
+                <a:latin typeface="Montserrat" pitchFamily="2" charset="77"/>
+                <a:ea typeface="+mn-ea"/>
+                <a:cs typeface="+mn-cs"/>
+              </a:defRPr>
+            </a:lvl3pPr>
+            <a:lvl4pPr marL="180000" indent="-180000" algn="l" defTabSz="914400" rtl="0" eaLnBrk="1" latinLnBrk="0" hangingPunct="1">
+              <a:lnSpc>
+                <a:spcPct val="100000"/>
+              </a:lnSpc>
+              <a:spcBef>
+                <a:spcPts val="0"/>
+              </a:spcBef>
+              <a:spcAft>
+                <a:spcPts val="650"/>
+              </a:spcAft>
+              <a:buSzPct val="120000"/>
+              <a:buFont typeface="Arial" panose="020B0604020202020204" pitchFamily="34" charset="0"/>
+              <a:buChar char="•"/>
+              <a:tabLst/>
+              <a:defRPr sz="2000" b="0" kern="1200">
+                <a:solidFill>
+                  <a:schemeClr val="tx1"/>
+                </a:solidFill>
+                <a:latin typeface="Montserrat" pitchFamily="2" charset="77"/>
+                <a:ea typeface="+mn-ea"/>
+                <a:cs typeface="+mn-cs"/>
+              </a:defRPr>
+            </a:lvl4pPr>
+            <a:lvl5pPr marL="180000" indent="-180000" algn="l" defTabSz="914400" rtl="0" eaLnBrk="1" latinLnBrk="0" hangingPunct="1">
+              <a:lnSpc>
+                <a:spcPct val="100000"/>
+              </a:lnSpc>
+              <a:spcBef>
+                <a:spcPts val="0"/>
+              </a:spcBef>
+              <a:spcAft>
+                <a:spcPts val="650"/>
+              </a:spcAft>
+              <a:buSzPct val="125000"/>
+              <a:buFont typeface="Arial" panose="020B0604020202020204" pitchFamily="34" charset="0"/>
+              <a:buChar char="•"/>
+              <a:tabLst/>
+              <a:defRPr sz="2000" b="0" kern="1200">
+                <a:solidFill>
+                  <a:schemeClr val="tx1"/>
+                </a:solidFill>
+                <a:latin typeface="Montserrat" pitchFamily="2" charset="77"/>
+                <a:ea typeface="+mn-ea"/>
+                <a:cs typeface="+mn-cs"/>
+              </a:defRPr>
+            </a:lvl5pPr>
+            <a:lvl6pPr marL="2514600" indent="-228600" algn="l" defTabSz="914400" rtl="0" eaLnBrk="1" latinLnBrk="0" hangingPunct="1">
+              <a:lnSpc>
+                <a:spcPct val="90000"/>
+              </a:lnSpc>
+              <a:spcBef>
+                <a:spcPts val="500"/>
+              </a:spcBef>
+              <a:buFont typeface="Arial" panose="020B0604020202020204" pitchFamily="34" charset="0"/>
+              <a:buChar char="•"/>
+              <a:defRPr sz="1800" kern="1200">
+                <a:solidFill>
+                  <a:schemeClr val="tx1"/>
+                </a:solidFill>
+                <a:latin typeface="+mn-lt"/>
+                <a:ea typeface="+mn-ea"/>
+                <a:cs typeface="+mn-cs"/>
+              </a:defRPr>
+            </a:lvl6pPr>
+            <a:lvl7pPr marL="2971800" indent="-228600" algn="l" defTabSz="914400" rtl="0" eaLnBrk="1" latinLnBrk="0" hangingPunct="1">
+              <a:lnSpc>
+                <a:spcPct val="90000"/>
+              </a:lnSpc>
+              <a:spcBef>
+                <a:spcPts val="500"/>
+              </a:spcBef>
+              <a:buFont typeface="Arial" panose="020B0604020202020204" pitchFamily="34" charset="0"/>
+              <a:buChar char="•"/>
+              <a:defRPr sz="1800" kern="1200">
+                <a:solidFill>
+                  <a:schemeClr val="tx1"/>
+                </a:solidFill>
+                <a:latin typeface="+mn-lt"/>
+                <a:ea typeface="+mn-ea"/>
+                <a:cs typeface="+mn-cs"/>
+              </a:defRPr>
+            </a:lvl7pPr>
+            <a:lvl8pPr marL="3429000" indent="-228600" algn="l" defTabSz="914400" rtl="0" eaLnBrk="1" latinLnBrk="0" hangingPunct="1">
+              <a:lnSpc>
+                <a:spcPct val="90000"/>
+              </a:lnSpc>
+              <a:spcBef>
+                <a:spcPts val="500"/>
+              </a:spcBef>
+              <a:buFont typeface="Arial" panose="020B0604020202020204" pitchFamily="34" charset="0"/>
+              <a:buChar char="•"/>
+              <a:defRPr sz="1800" kern="1200">
+                <a:solidFill>
+                  <a:schemeClr val="tx1"/>
+                </a:solidFill>
+                <a:latin typeface="+mn-lt"/>
+                <a:ea typeface="+mn-ea"/>
+                <a:cs typeface="+mn-cs"/>
+              </a:defRPr>
+            </a:lvl8pPr>
+            <a:lvl9pPr marL="3886200" indent="-228600" algn="l" defTabSz="914400" rtl="0" eaLnBrk="1" latinLnBrk="0" hangingPunct="1">
+              <a:lnSpc>
+                <a:spcPct val="90000"/>
+              </a:lnSpc>
+              <a:spcBef>
+                <a:spcPts val="500"/>
+              </a:spcBef>
+              <a:buFont typeface="Arial" panose="020B0604020202020204" pitchFamily="34" charset="0"/>
+              <a:buChar char="•"/>
+              <a:defRPr sz="1800" kern="1200">
+                <a:solidFill>
+                  <a:schemeClr val="tx1"/>
+                </a:solidFill>
+                <a:latin typeface="+mn-lt"/>
+                <a:ea typeface="+mn-ea"/>
+                <a:cs typeface="+mn-cs"/>
+              </a:defRPr>
+            </a:lvl9pPr>
+          </a:lstStyle>
+          <a:p>
+            <a:r>
+              <a:rPr lang="en-GB" dirty="0"/>
+              <a:t>In this example, we have an input box which takes temperature in Celsius</a:t>
+            </a:r>
+          </a:p>
+          <a:p>
+            <a:endParaRPr lang="en-GB" dirty="0"/>
+          </a:p>
+          <a:p>
+            <a:endParaRPr lang="en-GB" dirty="0"/>
+          </a:p>
+          <a:p>
+            <a:endParaRPr lang="en-GB" dirty="0"/>
+          </a:p>
+          <a:p>
+            <a:endParaRPr lang="en-GB" dirty="0"/>
+          </a:p>
+          <a:p>
+            <a:endParaRPr lang="en-GB" dirty="0"/>
+          </a:p>
+        </p:txBody>
+      </p:sp>
+      <p:pic>
+        <p:nvPicPr>
+          <p:cNvPr id="9" name="Picture 8">
+            <a:extLst>
+              <a:ext uri="{FF2B5EF4-FFF2-40B4-BE49-F238E27FC236}">
+                <a16:creationId xmlns:a16="http://schemas.microsoft.com/office/drawing/2014/main" id="{AE590844-679A-9119-4FC7-9670F72613F4}"/>
+              </a:ext>
+            </a:extLst>
+          </p:cNvPr>
+          <p:cNvPicPr>
+            <a:picLocks noChangeAspect="1"/>
+          </p:cNvPicPr>
+          <p:nvPr/>
+        </p:nvPicPr>
+        <p:blipFill>
+          <a:blip r:embed="rId4"/>
+          <a:stretch>
+            <a:fillRect/>
+          </a:stretch>
+        </p:blipFill>
+        <p:spPr>
+          <a:xfrm>
+            <a:off x="4183369" y="4008905"/>
+            <a:ext cx="7465793" cy="1863180"/>
+          </a:xfrm>
+          <a:prstGeom prst="rect">
+            <a:avLst/>
+          </a:prstGeom>
+          <a:ln>
+            <a:solidFill>
+              <a:schemeClr val="tx1"/>
+            </a:solidFill>
+          </a:ln>
+          <a:effectLst>
+            <a:outerShdw blurRad="50800" dist="38100" dir="2700000" algn="tl" rotWithShape="0">
+              <a:prstClr val="black">
+                <a:alpha val="40000"/>
+              </a:prstClr>
+            </a:outerShdw>
+          </a:effectLst>
+        </p:spPr>
+      </p:pic>
+    </p:spTree>
+    <p:extLst>
+      <p:ext uri="{BB962C8B-B14F-4D97-AF65-F5344CB8AC3E}">
+        <p14:creationId xmlns:p14="http://schemas.microsoft.com/office/powerpoint/2010/main" val="638200110"/>
+      </p:ext>
+    </p:extLst>
+  </p:cSld>
+  <p:clrMapOvr>
+    <a:masterClrMapping/>
+  </p:clrMapOvr>
+</p:sld>
+</file>
+
+<file path=ppt/slides/slide26.xml><?xml version="1.0" encoding="utf-8"?>
+<p:sld xmlns:a="http://schemas.openxmlformats.org/drawingml/2006/main" xmlns:r="http://schemas.openxmlformats.org/officeDocument/2006/relationships" xmlns:p="http://schemas.openxmlformats.org/presentationml/2006/main">
+  <p:cSld>
+    <p:spTree>
+      <p:nvGrpSpPr>
+        <p:cNvPr id="1" name="">
+          <a:extLst>
+            <a:ext uri="{FF2B5EF4-FFF2-40B4-BE49-F238E27FC236}">
+              <a16:creationId xmlns:a16="http://schemas.microsoft.com/office/drawing/2014/main" id="{B0367F96-9C6A-5382-056E-18AF3232EDD0}"/>
+            </a:ext>
+          </a:extLst>
+        </p:cNvPr>
+        <p:cNvGrpSpPr/>
+        <p:nvPr/>
+      </p:nvGrpSpPr>
+      <p:grpSpPr>
+        <a:xfrm>
+          <a:off x="0" y="0"/>
+          <a:ext cx="0" cy="0"/>
+          <a:chOff x="0" y="0"/>
+          <a:chExt cx="0" cy="0"/>
+        </a:xfrm>
+      </p:grpSpPr>
+      <p:sp>
+        <p:nvSpPr>
+          <p:cNvPr id="2" name="Text Placeholder 1">
+            <a:extLst>
+              <a:ext uri="{FF2B5EF4-FFF2-40B4-BE49-F238E27FC236}">
+                <a16:creationId xmlns:a16="http://schemas.microsoft.com/office/drawing/2014/main" id="{D2090DC4-3E82-159F-1A2C-98C818F8D5C8}"/>
+              </a:ext>
+            </a:extLst>
+          </p:cNvPr>
+          <p:cNvSpPr>
+            <a:spLocks noGrp="1"/>
+          </p:cNvSpPr>
+          <p:nvPr>
+            <p:ph type="body" sz="quarter" idx="10"/>
+          </p:nvPr>
+        </p:nvSpPr>
+        <p:spPr>
+          <a:xfrm>
+            <a:off x="375629" y="2744921"/>
+            <a:ext cx="3694112" cy="730876"/>
+          </a:xfrm>
+        </p:spPr>
+        <p:txBody>
+          <a:bodyPr/>
+          <a:lstStyle/>
+          <a:p>
+            <a:r>
+              <a:rPr lang="en-GB" dirty="0"/>
+              <a:t>Render Props Pattern</a:t>
+            </a:r>
+          </a:p>
+        </p:txBody>
+      </p:sp>
+      <p:sp>
+        <p:nvSpPr>
+          <p:cNvPr id="4" name="Slide Number Placeholder 3">
+            <a:extLst>
+              <a:ext uri="{FF2B5EF4-FFF2-40B4-BE49-F238E27FC236}">
+                <a16:creationId xmlns:a16="http://schemas.microsoft.com/office/drawing/2014/main" id="{DC0F1266-6B92-0929-09B5-6C23C808EAAB}"/>
+              </a:ext>
+            </a:extLst>
+          </p:cNvPr>
+          <p:cNvSpPr>
+            <a:spLocks noGrp="1"/>
+          </p:cNvSpPr>
+          <p:nvPr>
+            <p:ph type="sldNum" sz="quarter" idx="4"/>
+          </p:nvPr>
+        </p:nvSpPr>
+        <p:spPr/>
+        <p:txBody>
+          <a:bodyPr/>
+          <a:lstStyle/>
+          <a:p>
+            <a:fld id="{EF892D59-8F09-EF4B-AD6D-DA609442F868}" type="slidenum">
+              <a:rPr lang="en-GB" smtClean="0"/>
+              <a:pPr/>
+              <a:t>26</a:t>
+            </a:fld>
+            <a:endParaRPr lang="en-GB" dirty="0"/>
+          </a:p>
+        </p:txBody>
+      </p:sp>
+      <p:sp>
+        <p:nvSpPr>
+          <p:cNvPr id="7" name="Text Placeholder 5">
+            <a:extLst>
+              <a:ext uri="{FF2B5EF4-FFF2-40B4-BE49-F238E27FC236}">
+                <a16:creationId xmlns:a16="http://schemas.microsoft.com/office/drawing/2014/main" id="{90D69486-7B54-95B8-8668-39A36A80568E}"/>
+              </a:ext>
+            </a:extLst>
+          </p:cNvPr>
+          <p:cNvSpPr txBox="1">
+            <a:spLocks/>
+          </p:cNvSpPr>
+          <p:nvPr/>
+        </p:nvSpPr>
+        <p:spPr>
+          <a:xfrm>
+            <a:off x="6027649" y="804714"/>
+            <a:ext cx="5621513" cy="4175993"/>
+          </a:xfrm>
+          <a:prstGeom prst="rect">
+            <a:avLst/>
+          </a:prstGeom>
+        </p:spPr>
+        <p:txBody>
+          <a:bodyPr vert="horz" lIns="0" tIns="0" rIns="0" bIns="0" rtlCol="0" anchor="t" anchorCtr="0">
+            <a:noAutofit/>
+          </a:bodyPr>
+          <a:lstStyle>
+            <a:lvl1pPr marL="0" indent="0" algn="l" defTabSz="914400" rtl="0" eaLnBrk="1" latinLnBrk="0" hangingPunct="1">
+              <a:lnSpc>
+                <a:spcPct val="100000"/>
+              </a:lnSpc>
+              <a:spcBef>
+                <a:spcPts val="0"/>
+              </a:spcBef>
+              <a:spcAft>
+                <a:spcPts val="650"/>
+              </a:spcAft>
+              <a:buSzPct val="115000"/>
+              <a:buFont typeface="Arial" panose="020B0604020202020204" pitchFamily="34" charset="0"/>
+              <a:buNone/>
+              <a:defRPr sz="2000" b="0" i="0" kern="1200">
+                <a:solidFill>
+                  <a:schemeClr val="tx1"/>
+                </a:solidFill>
+                <a:latin typeface="Montserrat" pitchFamily="2" charset="77"/>
+                <a:ea typeface="+mn-ea"/>
+                <a:cs typeface="+mn-cs"/>
+              </a:defRPr>
+            </a:lvl1pPr>
+            <a:lvl2pPr marL="180000" marR="0" indent="-180000" algn="l" defTabSz="914400" rtl="0" eaLnBrk="1" fontAlgn="auto" latinLnBrk="0" hangingPunct="1">
+              <a:lnSpc>
+                <a:spcPct val="100000"/>
+              </a:lnSpc>
+              <a:spcBef>
+                <a:spcPts val="0"/>
+              </a:spcBef>
+              <a:spcAft>
+                <a:spcPts val="1200"/>
+              </a:spcAft>
+              <a:buClrTx/>
+              <a:buSzPct val="125000"/>
+              <a:buFont typeface="Arial" panose="020B0604020202020204" pitchFamily="34" charset="0"/>
+              <a:buChar char="•"/>
+              <a:tabLst/>
+              <a:defRPr sz="2000" b="0" kern="1200">
+                <a:solidFill>
+                  <a:schemeClr val="tx1"/>
+                </a:solidFill>
+                <a:latin typeface="Montserrat" pitchFamily="2" charset="77"/>
+                <a:ea typeface="+mn-ea"/>
+                <a:cs typeface="+mn-cs"/>
+              </a:defRPr>
+            </a:lvl2pPr>
+            <a:lvl3pPr marL="180000" indent="-180000" algn="l" defTabSz="914400" rtl="0" eaLnBrk="1" latinLnBrk="0" hangingPunct="1">
+              <a:lnSpc>
+                <a:spcPct val="100000"/>
+              </a:lnSpc>
+              <a:spcBef>
+                <a:spcPts val="0"/>
+              </a:spcBef>
+              <a:spcAft>
+                <a:spcPts val="650"/>
+              </a:spcAft>
+              <a:buSzPct val="120000"/>
+              <a:buFont typeface="Arial" panose="020B0604020202020204" pitchFamily="34" charset="0"/>
+              <a:buChar char="•"/>
+              <a:tabLst/>
+              <a:defRPr sz="2000" b="0" i="0" kern="1200">
+                <a:solidFill>
+                  <a:schemeClr val="tx1"/>
+                </a:solidFill>
+                <a:latin typeface="Montserrat" pitchFamily="2" charset="77"/>
+                <a:ea typeface="+mn-ea"/>
+                <a:cs typeface="+mn-cs"/>
+              </a:defRPr>
+            </a:lvl3pPr>
+            <a:lvl4pPr marL="180000" indent="-180000" algn="l" defTabSz="914400" rtl="0" eaLnBrk="1" latinLnBrk="0" hangingPunct="1">
+              <a:lnSpc>
+                <a:spcPct val="100000"/>
+              </a:lnSpc>
+              <a:spcBef>
+                <a:spcPts val="0"/>
+              </a:spcBef>
+              <a:spcAft>
+                <a:spcPts val="650"/>
+              </a:spcAft>
+              <a:buSzPct val="120000"/>
+              <a:buFont typeface="Arial" panose="020B0604020202020204" pitchFamily="34" charset="0"/>
+              <a:buChar char="•"/>
+              <a:tabLst/>
+              <a:defRPr sz="2000" b="0" kern="1200">
+                <a:solidFill>
+                  <a:schemeClr val="tx1"/>
+                </a:solidFill>
+                <a:latin typeface="Montserrat" pitchFamily="2" charset="77"/>
+                <a:ea typeface="+mn-ea"/>
+                <a:cs typeface="+mn-cs"/>
+              </a:defRPr>
+            </a:lvl4pPr>
+            <a:lvl5pPr marL="180000" indent="-180000" algn="l" defTabSz="914400" rtl="0" eaLnBrk="1" latinLnBrk="0" hangingPunct="1">
+              <a:lnSpc>
+                <a:spcPct val="100000"/>
+              </a:lnSpc>
+              <a:spcBef>
+                <a:spcPts val="0"/>
+              </a:spcBef>
+              <a:spcAft>
+                <a:spcPts val="650"/>
+              </a:spcAft>
+              <a:buSzPct val="125000"/>
+              <a:buFont typeface="Arial" panose="020B0604020202020204" pitchFamily="34" charset="0"/>
+              <a:buChar char="•"/>
+              <a:tabLst/>
+              <a:defRPr sz="2000" b="0" kern="1200">
+                <a:solidFill>
+                  <a:schemeClr val="tx1"/>
+                </a:solidFill>
+                <a:latin typeface="Montserrat" pitchFamily="2" charset="77"/>
+                <a:ea typeface="+mn-ea"/>
+                <a:cs typeface="+mn-cs"/>
+              </a:defRPr>
+            </a:lvl5pPr>
+            <a:lvl6pPr marL="2514600" indent="-228600" algn="l" defTabSz="914400" rtl="0" eaLnBrk="1" latinLnBrk="0" hangingPunct="1">
+              <a:lnSpc>
+                <a:spcPct val="90000"/>
+              </a:lnSpc>
+              <a:spcBef>
+                <a:spcPts val="500"/>
+              </a:spcBef>
+              <a:buFont typeface="Arial" panose="020B0604020202020204" pitchFamily="34" charset="0"/>
+              <a:buChar char="•"/>
+              <a:defRPr sz="1800" kern="1200">
+                <a:solidFill>
+                  <a:schemeClr val="tx1"/>
+                </a:solidFill>
+                <a:latin typeface="+mn-lt"/>
+                <a:ea typeface="+mn-ea"/>
+                <a:cs typeface="+mn-cs"/>
+              </a:defRPr>
+            </a:lvl6pPr>
+            <a:lvl7pPr marL="2971800" indent="-228600" algn="l" defTabSz="914400" rtl="0" eaLnBrk="1" latinLnBrk="0" hangingPunct="1">
+              <a:lnSpc>
+                <a:spcPct val="90000"/>
+              </a:lnSpc>
+              <a:spcBef>
+                <a:spcPts val="500"/>
+              </a:spcBef>
+              <a:buFont typeface="Arial" panose="020B0604020202020204" pitchFamily="34" charset="0"/>
+              <a:buChar char="•"/>
+              <a:defRPr sz="1800" kern="1200">
+                <a:solidFill>
+                  <a:schemeClr val="tx1"/>
+                </a:solidFill>
+                <a:latin typeface="+mn-lt"/>
+                <a:ea typeface="+mn-ea"/>
+                <a:cs typeface="+mn-cs"/>
+              </a:defRPr>
+            </a:lvl7pPr>
+            <a:lvl8pPr marL="3429000" indent="-228600" algn="l" defTabSz="914400" rtl="0" eaLnBrk="1" latinLnBrk="0" hangingPunct="1">
+              <a:lnSpc>
+                <a:spcPct val="90000"/>
+              </a:lnSpc>
+              <a:spcBef>
+                <a:spcPts val="500"/>
+              </a:spcBef>
+              <a:buFont typeface="Arial" panose="020B0604020202020204" pitchFamily="34" charset="0"/>
+              <a:buChar char="•"/>
+              <a:defRPr sz="1800" kern="1200">
+                <a:solidFill>
+                  <a:schemeClr val="tx1"/>
+                </a:solidFill>
+                <a:latin typeface="+mn-lt"/>
+                <a:ea typeface="+mn-ea"/>
+                <a:cs typeface="+mn-cs"/>
+              </a:defRPr>
+            </a:lvl8pPr>
+            <a:lvl9pPr marL="3886200" indent="-228600" algn="l" defTabSz="914400" rtl="0" eaLnBrk="1" latinLnBrk="0" hangingPunct="1">
+              <a:lnSpc>
+                <a:spcPct val="90000"/>
+              </a:lnSpc>
+              <a:spcBef>
+                <a:spcPts val="500"/>
+              </a:spcBef>
+              <a:buFont typeface="Arial" panose="020B0604020202020204" pitchFamily="34" charset="0"/>
+              <a:buChar char="•"/>
+              <a:defRPr sz="1800" kern="1200">
+                <a:solidFill>
+                  <a:schemeClr val="tx1"/>
+                </a:solidFill>
+                <a:latin typeface="+mn-lt"/>
+                <a:ea typeface="+mn-ea"/>
+                <a:cs typeface="+mn-cs"/>
+              </a:defRPr>
+            </a:lvl9pPr>
+          </a:lstStyle>
+          <a:p>
+            <a:r>
+              <a:rPr lang="en-GB" dirty="0"/>
+              <a:t>There are 2 almost identical components, one which takes a value and converts it to Fahrenheit, the other to Kelvin</a:t>
+            </a:r>
+          </a:p>
+          <a:p>
+            <a:endParaRPr lang="en-GB" dirty="0"/>
+          </a:p>
+          <a:p>
+            <a:endParaRPr lang="en-GB" dirty="0"/>
+          </a:p>
+          <a:p>
+            <a:endParaRPr lang="en-GB" dirty="0"/>
+          </a:p>
+          <a:p>
+            <a:endParaRPr lang="en-GB" dirty="0"/>
+          </a:p>
+          <a:p>
+            <a:endParaRPr lang="en-GB" dirty="0"/>
+          </a:p>
+        </p:txBody>
+      </p:sp>
+      <p:pic>
+        <p:nvPicPr>
+          <p:cNvPr id="5" name="Picture 4">
+            <a:extLst>
+              <a:ext uri="{FF2B5EF4-FFF2-40B4-BE49-F238E27FC236}">
+                <a16:creationId xmlns:a16="http://schemas.microsoft.com/office/drawing/2014/main" id="{38695642-976D-1AEC-6411-EF05DF98A5EA}"/>
+              </a:ext>
+            </a:extLst>
+          </p:cNvPr>
+          <p:cNvPicPr>
+            <a:picLocks noChangeAspect="1"/>
+          </p:cNvPicPr>
+          <p:nvPr/>
+        </p:nvPicPr>
+        <p:blipFill>
+          <a:blip r:embed="rId3"/>
+          <a:stretch>
+            <a:fillRect/>
+          </a:stretch>
+        </p:blipFill>
+        <p:spPr>
+          <a:xfrm>
+            <a:off x="4478333" y="1892315"/>
+            <a:ext cx="7338038" cy="1424630"/>
+          </a:xfrm>
+          <a:prstGeom prst="rect">
+            <a:avLst/>
+          </a:prstGeom>
+        </p:spPr>
+      </p:pic>
+      <p:pic>
+        <p:nvPicPr>
+          <p:cNvPr id="10" name="Picture 9">
+            <a:extLst>
+              <a:ext uri="{FF2B5EF4-FFF2-40B4-BE49-F238E27FC236}">
+                <a16:creationId xmlns:a16="http://schemas.microsoft.com/office/drawing/2014/main" id="{B13E94AF-B8D2-8EAD-7C32-9A0B93481683}"/>
+              </a:ext>
+            </a:extLst>
+          </p:cNvPr>
+          <p:cNvPicPr>
+            <a:picLocks noChangeAspect="1"/>
+          </p:cNvPicPr>
+          <p:nvPr/>
+        </p:nvPicPr>
+        <p:blipFill>
+          <a:blip r:embed="rId4"/>
+          <a:stretch>
+            <a:fillRect/>
+          </a:stretch>
+        </p:blipFill>
+        <p:spPr>
+          <a:xfrm>
+            <a:off x="4471373" y="3637676"/>
+            <a:ext cx="7344998" cy="1402781"/>
+          </a:xfrm>
+          <a:prstGeom prst="rect">
+            <a:avLst/>
+          </a:prstGeom>
+        </p:spPr>
+      </p:pic>
+    </p:spTree>
+    <p:extLst>
+      <p:ext uri="{BB962C8B-B14F-4D97-AF65-F5344CB8AC3E}">
+        <p14:creationId xmlns:p14="http://schemas.microsoft.com/office/powerpoint/2010/main" val="188055928"/>
+      </p:ext>
+    </p:extLst>
+  </p:cSld>
+  <p:clrMapOvr>
+    <a:masterClrMapping/>
+  </p:clrMapOvr>
+</p:sld>
+</file>
+
+<file path=ppt/slides/slide27.xml><?xml version="1.0" encoding="utf-8"?>
+<p:sld xmlns:a="http://schemas.openxmlformats.org/drawingml/2006/main" xmlns:r="http://schemas.openxmlformats.org/officeDocument/2006/relationships" xmlns:p="http://schemas.openxmlformats.org/presentationml/2006/main">
+  <p:cSld>
+    <p:spTree>
+      <p:nvGrpSpPr>
+        <p:cNvPr id="1" name="">
+          <a:extLst>
+            <a:ext uri="{FF2B5EF4-FFF2-40B4-BE49-F238E27FC236}">
+              <a16:creationId xmlns:a16="http://schemas.microsoft.com/office/drawing/2014/main" id="{1DC8FB00-3925-03A6-FC34-6C56144CB30F}"/>
+            </a:ext>
+          </a:extLst>
+        </p:cNvPr>
+        <p:cNvGrpSpPr/>
+        <p:nvPr/>
+      </p:nvGrpSpPr>
+      <p:grpSpPr>
+        <a:xfrm>
+          <a:off x="0" y="0"/>
+          <a:ext cx="0" cy="0"/>
+          <a:chOff x="0" y="0"/>
+          <a:chExt cx="0" cy="0"/>
+        </a:xfrm>
+      </p:grpSpPr>
+      <p:sp>
+        <p:nvSpPr>
+          <p:cNvPr id="2" name="Text Placeholder 1">
+            <a:extLst>
+              <a:ext uri="{FF2B5EF4-FFF2-40B4-BE49-F238E27FC236}">
+                <a16:creationId xmlns:a16="http://schemas.microsoft.com/office/drawing/2014/main" id="{68F95541-122B-BD6B-D931-523B7CFEDE0A}"/>
+              </a:ext>
+            </a:extLst>
+          </p:cNvPr>
+          <p:cNvSpPr>
+            <a:spLocks noGrp="1"/>
+          </p:cNvSpPr>
+          <p:nvPr>
+            <p:ph type="body" sz="quarter" idx="10"/>
+          </p:nvPr>
+        </p:nvSpPr>
+        <p:spPr>
+          <a:xfrm>
+            <a:off x="375629" y="2744921"/>
+            <a:ext cx="3694112" cy="730876"/>
+          </a:xfrm>
+        </p:spPr>
+        <p:txBody>
+          <a:bodyPr/>
+          <a:lstStyle/>
+          <a:p>
+            <a:r>
+              <a:rPr lang="en-GB" dirty="0"/>
+              <a:t>Render Props Pattern</a:t>
+            </a:r>
+          </a:p>
+        </p:txBody>
+      </p:sp>
+      <p:sp>
+        <p:nvSpPr>
+          <p:cNvPr id="4" name="Slide Number Placeholder 3">
+            <a:extLst>
+              <a:ext uri="{FF2B5EF4-FFF2-40B4-BE49-F238E27FC236}">
+                <a16:creationId xmlns:a16="http://schemas.microsoft.com/office/drawing/2014/main" id="{70DB21A6-D223-D935-AC76-05FF64394D3D}"/>
+              </a:ext>
+            </a:extLst>
+          </p:cNvPr>
+          <p:cNvSpPr>
+            <a:spLocks noGrp="1"/>
+          </p:cNvSpPr>
+          <p:nvPr>
+            <p:ph type="sldNum" sz="quarter" idx="4"/>
+          </p:nvPr>
+        </p:nvSpPr>
+        <p:spPr/>
+        <p:txBody>
+          <a:bodyPr/>
+          <a:lstStyle/>
+          <a:p>
+            <a:fld id="{EF892D59-8F09-EF4B-AD6D-DA609442F868}" type="slidenum">
+              <a:rPr lang="en-GB" smtClean="0"/>
+              <a:pPr/>
+              <a:t>27</a:t>
+            </a:fld>
+            <a:endParaRPr lang="en-GB" dirty="0"/>
+          </a:p>
+        </p:txBody>
+      </p:sp>
+      <p:sp>
+        <p:nvSpPr>
+          <p:cNvPr id="7" name="Text Placeholder 5">
+            <a:extLst>
+              <a:ext uri="{FF2B5EF4-FFF2-40B4-BE49-F238E27FC236}">
+                <a16:creationId xmlns:a16="http://schemas.microsoft.com/office/drawing/2014/main" id="{C0EC08DE-8441-BE84-1CBF-6CF40C738250}"/>
+              </a:ext>
+            </a:extLst>
+          </p:cNvPr>
+          <p:cNvSpPr txBox="1">
+            <a:spLocks/>
+          </p:cNvSpPr>
+          <p:nvPr/>
+        </p:nvSpPr>
+        <p:spPr>
+          <a:xfrm>
+            <a:off x="6027649" y="804714"/>
+            <a:ext cx="5621513" cy="4175993"/>
+          </a:xfrm>
+          <a:prstGeom prst="rect">
+            <a:avLst/>
+          </a:prstGeom>
+        </p:spPr>
+        <p:txBody>
+          <a:bodyPr vert="horz" lIns="0" tIns="0" rIns="0" bIns="0" rtlCol="0" anchor="t" anchorCtr="0">
+            <a:noAutofit/>
+          </a:bodyPr>
+          <a:lstStyle>
+            <a:lvl1pPr marL="0" indent="0" algn="l" defTabSz="914400" rtl="0" eaLnBrk="1" latinLnBrk="0" hangingPunct="1">
+              <a:lnSpc>
+                <a:spcPct val="100000"/>
+              </a:lnSpc>
+              <a:spcBef>
+                <a:spcPts val="0"/>
+              </a:spcBef>
+              <a:spcAft>
+                <a:spcPts val="650"/>
+              </a:spcAft>
+              <a:buSzPct val="115000"/>
+              <a:buFont typeface="Arial" panose="020B0604020202020204" pitchFamily="34" charset="0"/>
+              <a:buNone/>
+              <a:defRPr sz="2000" b="0" i="0" kern="1200">
+                <a:solidFill>
+                  <a:schemeClr val="tx1"/>
+                </a:solidFill>
+                <a:latin typeface="Montserrat" pitchFamily="2" charset="77"/>
+                <a:ea typeface="+mn-ea"/>
+                <a:cs typeface="+mn-cs"/>
+              </a:defRPr>
+            </a:lvl1pPr>
+            <a:lvl2pPr marL="180000" marR="0" indent="-180000" algn="l" defTabSz="914400" rtl="0" eaLnBrk="1" fontAlgn="auto" latinLnBrk="0" hangingPunct="1">
+              <a:lnSpc>
+                <a:spcPct val="100000"/>
+              </a:lnSpc>
+              <a:spcBef>
+                <a:spcPts val="0"/>
+              </a:spcBef>
+              <a:spcAft>
+                <a:spcPts val="1200"/>
+              </a:spcAft>
+              <a:buClrTx/>
+              <a:buSzPct val="125000"/>
+              <a:buFont typeface="Arial" panose="020B0604020202020204" pitchFamily="34" charset="0"/>
+              <a:buChar char="•"/>
+              <a:tabLst/>
+              <a:defRPr sz="2000" b="0" kern="1200">
+                <a:solidFill>
+                  <a:schemeClr val="tx1"/>
+                </a:solidFill>
+                <a:latin typeface="Montserrat" pitchFamily="2" charset="77"/>
+                <a:ea typeface="+mn-ea"/>
+                <a:cs typeface="+mn-cs"/>
+              </a:defRPr>
+            </a:lvl2pPr>
+            <a:lvl3pPr marL="180000" indent="-180000" algn="l" defTabSz="914400" rtl="0" eaLnBrk="1" latinLnBrk="0" hangingPunct="1">
+              <a:lnSpc>
+                <a:spcPct val="100000"/>
+              </a:lnSpc>
+              <a:spcBef>
+                <a:spcPts val="0"/>
+              </a:spcBef>
+              <a:spcAft>
+                <a:spcPts val="650"/>
+              </a:spcAft>
+              <a:buSzPct val="120000"/>
+              <a:buFont typeface="Arial" panose="020B0604020202020204" pitchFamily="34" charset="0"/>
+              <a:buChar char="•"/>
+              <a:tabLst/>
+              <a:defRPr sz="2000" b="0" i="0" kern="1200">
+                <a:solidFill>
+                  <a:schemeClr val="tx1"/>
+                </a:solidFill>
+                <a:latin typeface="Montserrat" pitchFamily="2" charset="77"/>
+                <a:ea typeface="+mn-ea"/>
+                <a:cs typeface="+mn-cs"/>
+              </a:defRPr>
+            </a:lvl3pPr>
+            <a:lvl4pPr marL="180000" indent="-180000" algn="l" defTabSz="914400" rtl="0" eaLnBrk="1" latinLnBrk="0" hangingPunct="1">
+              <a:lnSpc>
+                <a:spcPct val="100000"/>
+              </a:lnSpc>
+              <a:spcBef>
+                <a:spcPts val="0"/>
+              </a:spcBef>
+              <a:spcAft>
+                <a:spcPts val="650"/>
+              </a:spcAft>
+              <a:buSzPct val="120000"/>
+              <a:buFont typeface="Arial" panose="020B0604020202020204" pitchFamily="34" charset="0"/>
+              <a:buChar char="•"/>
+              <a:tabLst/>
+              <a:defRPr sz="2000" b="0" kern="1200">
+                <a:solidFill>
+                  <a:schemeClr val="tx1"/>
+                </a:solidFill>
+                <a:latin typeface="Montserrat" pitchFamily="2" charset="77"/>
+                <a:ea typeface="+mn-ea"/>
+                <a:cs typeface="+mn-cs"/>
+              </a:defRPr>
+            </a:lvl4pPr>
+            <a:lvl5pPr marL="180000" indent="-180000" algn="l" defTabSz="914400" rtl="0" eaLnBrk="1" latinLnBrk="0" hangingPunct="1">
+              <a:lnSpc>
+                <a:spcPct val="100000"/>
+              </a:lnSpc>
+              <a:spcBef>
+                <a:spcPts val="0"/>
+              </a:spcBef>
+              <a:spcAft>
+                <a:spcPts val="650"/>
+              </a:spcAft>
+              <a:buSzPct val="125000"/>
+              <a:buFont typeface="Arial" panose="020B0604020202020204" pitchFamily="34" charset="0"/>
+              <a:buChar char="•"/>
+              <a:tabLst/>
+              <a:defRPr sz="2000" b="0" kern="1200">
+                <a:solidFill>
+                  <a:schemeClr val="tx1"/>
+                </a:solidFill>
+                <a:latin typeface="Montserrat" pitchFamily="2" charset="77"/>
+                <a:ea typeface="+mn-ea"/>
+                <a:cs typeface="+mn-cs"/>
+              </a:defRPr>
+            </a:lvl5pPr>
+            <a:lvl6pPr marL="2514600" indent="-228600" algn="l" defTabSz="914400" rtl="0" eaLnBrk="1" latinLnBrk="0" hangingPunct="1">
+              <a:lnSpc>
+                <a:spcPct val="90000"/>
+              </a:lnSpc>
+              <a:spcBef>
+                <a:spcPts val="500"/>
+              </a:spcBef>
+              <a:buFont typeface="Arial" panose="020B0604020202020204" pitchFamily="34" charset="0"/>
+              <a:buChar char="•"/>
+              <a:defRPr sz="1800" kern="1200">
+                <a:solidFill>
+                  <a:schemeClr val="tx1"/>
+                </a:solidFill>
+                <a:latin typeface="+mn-lt"/>
+                <a:ea typeface="+mn-ea"/>
+                <a:cs typeface="+mn-cs"/>
+              </a:defRPr>
+            </a:lvl6pPr>
+            <a:lvl7pPr marL="2971800" indent="-228600" algn="l" defTabSz="914400" rtl="0" eaLnBrk="1" latinLnBrk="0" hangingPunct="1">
+              <a:lnSpc>
+                <a:spcPct val="90000"/>
+              </a:lnSpc>
+              <a:spcBef>
+                <a:spcPts val="500"/>
+              </a:spcBef>
+              <a:buFont typeface="Arial" panose="020B0604020202020204" pitchFamily="34" charset="0"/>
+              <a:buChar char="•"/>
+              <a:defRPr sz="1800" kern="1200">
+                <a:solidFill>
+                  <a:schemeClr val="tx1"/>
+                </a:solidFill>
+                <a:latin typeface="+mn-lt"/>
+                <a:ea typeface="+mn-ea"/>
+                <a:cs typeface="+mn-cs"/>
+              </a:defRPr>
+            </a:lvl7pPr>
+            <a:lvl8pPr marL="3429000" indent="-228600" algn="l" defTabSz="914400" rtl="0" eaLnBrk="1" latinLnBrk="0" hangingPunct="1">
+              <a:lnSpc>
+                <a:spcPct val="90000"/>
+              </a:lnSpc>
+              <a:spcBef>
+                <a:spcPts val="500"/>
+              </a:spcBef>
+              <a:buFont typeface="Arial" panose="020B0604020202020204" pitchFamily="34" charset="0"/>
+              <a:buChar char="•"/>
+              <a:defRPr sz="1800" kern="1200">
+                <a:solidFill>
+                  <a:schemeClr val="tx1"/>
+                </a:solidFill>
+                <a:latin typeface="+mn-lt"/>
+                <a:ea typeface="+mn-ea"/>
+                <a:cs typeface="+mn-cs"/>
+              </a:defRPr>
+            </a:lvl8pPr>
+            <a:lvl9pPr marL="3886200" indent="-228600" algn="l" defTabSz="914400" rtl="0" eaLnBrk="1" latinLnBrk="0" hangingPunct="1">
+              <a:lnSpc>
+                <a:spcPct val="90000"/>
+              </a:lnSpc>
+              <a:spcBef>
+                <a:spcPts val="500"/>
+              </a:spcBef>
+              <a:buFont typeface="Arial" panose="020B0604020202020204" pitchFamily="34" charset="0"/>
+              <a:buChar char="•"/>
+              <a:defRPr sz="1800" kern="1200">
+                <a:solidFill>
+                  <a:schemeClr val="tx1"/>
+                </a:solidFill>
+                <a:latin typeface="+mn-lt"/>
+                <a:ea typeface="+mn-ea"/>
+                <a:cs typeface="+mn-cs"/>
+              </a:defRPr>
+            </a:lvl9pPr>
+          </a:lstStyle>
+          <a:p>
+            <a:r>
+              <a:rPr lang="en-GB" dirty="0"/>
+              <a:t>In App.js, the input is taken from the user and then passed to each of the components, which then performs the function and returns the render.</a:t>
+            </a:r>
+          </a:p>
+          <a:p>
+            <a:endParaRPr lang="en-GB" dirty="0"/>
+          </a:p>
+          <a:p>
+            <a:endParaRPr lang="en-GB" dirty="0"/>
+          </a:p>
+          <a:p>
+            <a:endParaRPr lang="en-GB" dirty="0"/>
+          </a:p>
+          <a:p>
+            <a:endParaRPr lang="en-GB" dirty="0"/>
+          </a:p>
+          <a:p>
+            <a:endParaRPr lang="en-GB" dirty="0"/>
+          </a:p>
+        </p:txBody>
+      </p:sp>
+      <p:pic>
+        <p:nvPicPr>
+          <p:cNvPr id="6" name="Picture 5">
+            <a:extLst>
+              <a:ext uri="{FF2B5EF4-FFF2-40B4-BE49-F238E27FC236}">
+                <a16:creationId xmlns:a16="http://schemas.microsoft.com/office/drawing/2014/main" id="{E1633A30-46A4-E468-D13E-C36AB690A166}"/>
+              </a:ext>
+            </a:extLst>
+          </p:cNvPr>
+          <p:cNvPicPr>
+            <a:picLocks noChangeAspect="1"/>
+          </p:cNvPicPr>
+          <p:nvPr/>
+        </p:nvPicPr>
+        <p:blipFill>
+          <a:blip r:embed="rId3"/>
+          <a:stretch>
+            <a:fillRect/>
+          </a:stretch>
+        </p:blipFill>
+        <p:spPr>
+          <a:xfrm>
+            <a:off x="6190641" y="2353986"/>
+            <a:ext cx="4496427" cy="3953427"/>
+          </a:xfrm>
+          <a:prstGeom prst="rect">
+            <a:avLst/>
+          </a:prstGeom>
+        </p:spPr>
+      </p:pic>
+    </p:spTree>
+    <p:extLst>
+      <p:ext uri="{BB962C8B-B14F-4D97-AF65-F5344CB8AC3E}">
+        <p14:creationId xmlns:p14="http://schemas.microsoft.com/office/powerpoint/2010/main" val="4249404975"/>
+      </p:ext>
+    </p:extLst>
+  </p:cSld>
+  <p:clrMapOvr>
+    <a:masterClrMapping/>
+  </p:clrMapOvr>
+</p:sld>
+</file>
+
+<file path=ppt/slides/slide28.xml><?xml version="1.0" encoding="utf-8"?>
+<p:sld xmlns:a="http://schemas.openxmlformats.org/drawingml/2006/main" xmlns:r="http://schemas.openxmlformats.org/officeDocument/2006/relationships" xmlns:p="http://schemas.openxmlformats.org/presentationml/2006/main">
+  <p:cSld>
+    <p:spTree>
+      <p:nvGrpSpPr>
+        <p:cNvPr id="1" name="">
+          <a:extLst>
+            <a:ext uri="{FF2B5EF4-FFF2-40B4-BE49-F238E27FC236}">
+              <a16:creationId xmlns:a16="http://schemas.microsoft.com/office/drawing/2014/main" id="{2B811D67-B376-4117-BCDB-21DE45755EC4}"/>
+            </a:ext>
+          </a:extLst>
+        </p:cNvPr>
+        <p:cNvGrpSpPr/>
+        <p:nvPr/>
+      </p:nvGrpSpPr>
+      <p:grpSpPr>
+        <a:xfrm>
+          <a:off x="0" y="0"/>
+          <a:ext cx="0" cy="0"/>
+          <a:chOff x="0" y="0"/>
+          <a:chExt cx="0" cy="0"/>
+        </a:xfrm>
+      </p:grpSpPr>
+      <p:sp>
+        <p:nvSpPr>
+          <p:cNvPr id="2" name="Text Placeholder 1">
+            <a:extLst>
+              <a:ext uri="{FF2B5EF4-FFF2-40B4-BE49-F238E27FC236}">
+                <a16:creationId xmlns:a16="http://schemas.microsoft.com/office/drawing/2014/main" id="{255C8709-03F9-5D0A-35FB-F0AFA5D04866}"/>
+              </a:ext>
+            </a:extLst>
+          </p:cNvPr>
+          <p:cNvSpPr>
+            <a:spLocks noGrp="1"/>
+          </p:cNvSpPr>
+          <p:nvPr>
+            <p:ph type="body" sz="quarter" idx="10"/>
+          </p:nvPr>
+        </p:nvSpPr>
+        <p:spPr>
+          <a:xfrm>
+            <a:off x="375629" y="2744921"/>
+            <a:ext cx="3694112" cy="730876"/>
+          </a:xfrm>
+        </p:spPr>
+        <p:txBody>
+          <a:bodyPr/>
+          <a:lstStyle/>
+          <a:p>
+            <a:r>
+              <a:rPr lang="en-GB" dirty="0"/>
+              <a:t>Render Props Pattern</a:t>
+            </a:r>
+          </a:p>
+        </p:txBody>
+      </p:sp>
+      <p:sp>
+        <p:nvSpPr>
+          <p:cNvPr id="4" name="Slide Number Placeholder 3">
+            <a:extLst>
+              <a:ext uri="{FF2B5EF4-FFF2-40B4-BE49-F238E27FC236}">
+                <a16:creationId xmlns:a16="http://schemas.microsoft.com/office/drawing/2014/main" id="{A6CDF0A8-12B6-5361-9F2F-2F51A8461722}"/>
+              </a:ext>
+            </a:extLst>
+          </p:cNvPr>
+          <p:cNvSpPr>
+            <a:spLocks noGrp="1"/>
+          </p:cNvSpPr>
+          <p:nvPr>
+            <p:ph type="sldNum" sz="quarter" idx="4"/>
+          </p:nvPr>
+        </p:nvSpPr>
+        <p:spPr/>
+        <p:txBody>
+          <a:bodyPr/>
+          <a:lstStyle/>
+          <a:p>
+            <a:fld id="{EF892D59-8F09-EF4B-AD6D-DA609442F868}" type="slidenum">
+              <a:rPr lang="en-GB" smtClean="0"/>
+              <a:pPr/>
+              <a:t>28</a:t>
+            </a:fld>
+            <a:endParaRPr lang="en-GB" dirty="0"/>
+          </a:p>
+        </p:txBody>
+      </p:sp>
+      <p:sp>
+        <p:nvSpPr>
+          <p:cNvPr id="7" name="Text Placeholder 5">
+            <a:extLst>
+              <a:ext uri="{FF2B5EF4-FFF2-40B4-BE49-F238E27FC236}">
+                <a16:creationId xmlns:a16="http://schemas.microsoft.com/office/drawing/2014/main" id="{4A3D2A6E-7ECC-51C0-FA78-40383E8B6410}"/>
+              </a:ext>
+            </a:extLst>
+          </p:cNvPr>
+          <p:cNvSpPr txBox="1">
+            <a:spLocks/>
+          </p:cNvSpPr>
+          <p:nvPr/>
+        </p:nvSpPr>
+        <p:spPr>
+          <a:xfrm>
+            <a:off x="6027649" y="804714"/>
+            <a:ext cx="5621513" cy="4175993"/>
+          </a:xfrm>
+          <a:prstGeom prst="rect">
+            <a:avLst/>
+          </a:prstGeom>
+        </p:spPr>
+        <p:txBody>
+          <a:bodyPr vert="horz" lIns="0" tIns="0" rIns="0" bIns="0" rtlCol="0" anchor="t" anchorCtr="0">
+            <a:noAutofit/>
+          </a:bodyPr>
+          <a:lstStyle>
+            <a:lvl1pPr marL="0" indent="0" algn="l" defTabSz="914400" rtl="0" eaLnBrk="1" latinLnBrk="0" hangingPunct="1">
+              <a:lnSpc>
+                <a:spcPct val="100000"/>
+              </a:lnSpc>
+              <a:spcBef>
+                <a:spcPts val="0"/>
+              </a:spcBef>
+              <a:spcAft>
+                <a:spcPts val="650"/>
+              </a:spcAft>
+              <a:buSzPct val="115000"/>
+              <a:buFont typeface="Arial" panose="020B0604020202020204" pitchFamily="34" charset="0"/>
+              <a:buNone/>
+              <a:defRPr sz="2000" b="0" i="0" kern="1200">
+                <a:solidFill>
+                  <a:schemeClr val="tx1"/>
+                </a:solidFill>
+                <a:latin typeface="Montserrat" pitchFamily="2" charset="77"/>
+                <a:ea typeface="+mn-ea"/>
+                <a:cs typeface="+mn-cs"/>
+              </a:defRPr>
+            </a:lvl1pPr>
+            <a:lvl2pPr marL="180000" marR="0" indent="-180000" algn="l" defTabSz="914400" rtl="0" eaLnBrk="1" fontAlgn="auto" latinLnBrk="0" hangingPunct="1">
+              <a:lnSpc>
+                <a:spcPct val="100000"/>
+              </a:lnSpc>
+              <a:spcBef>
+                <a:spcPts val="0"/>
+              </a:spcBef>
+              <a:spcAft>
+                <a:spcPts val="1200"/>
+              </a:spcAft>
+              <a:buClrTx/>
+              <a:buSzPct val="125000"/>
+              <a:buFont typeface="Arial" panose="020B0604020202020204" pitchFamily="34" charset="0"/>
+              <a:buChar char="•"/>
+              <a:tabLst/>
+              <a:defRPr sz="2000" b="0" kern="1200">
+                <a:solidFill>
+                  <a:schemeClr val="tx1"/>
+                </a:solidFill>
+                <a:latin typeface="Montserrat" pitchFamily="2" charset="77"/>
+                <a:ea typeface="+mn-ea"/>
+                <a:cs typeface="+mn-cs"/>
+              </a:defRPr>
+            </a:lvl2pPr>
+            <a:lvl3pPr marL="180000" indent="-180000" algn="l" defTabSz="914400" rtl="0" eaLnBrk="1" latinLnBrk="0" hangingPunct="1">
+              <a:lnSpc>
+                <a:spcPct val="100000"/>
+              </a:lnSpc>
+              <a:spcBef>
+                <a:spcPts val="0"/>
+              </a:spcBef>
+              <a:spcAft>
+                <a:spcPts val="650"/>
+              </a:spcAft>
+              <a:buSzPct val="120000"/>
+              <a:buFont typeface="Arial" panose="020B0604020202020204" pitchFamily="34" charset="0"/>
+              <a:buChar char="•"/>
+              <a:tabLst/>
+              <a:defRPr sz="2000" b="0" i="0" kern="1200">
+                <a:solidFill>
+                  <a:schemeClr val="tx1"/>
+                </a:solidFill>
+                <a:latin typeface="Montserrat" pitchFamily="2" charset="77"/>
+                <a:ea typeface="+mn-ea"/>
+                <a:cs typeface="+mn-cs"/>
+              </a:defRPr>
+            </a:lvl3pPr>
+            <a:lvl4pPr marL="180000" indent="-180000" algn="l" defTabSz="914400" rtl="0" eaLnBrk="1" latinLnBrk="0" hangingPunct="1">
+              <a:lnSpc>
+                <a:spcPct val="100000"/>
+              </a:lnSpc>
+              <a:spcBef>
+                <a:spcPts val="0"/>
+              </a:spcBef>
+              <a:spcAft>
+                <a:spcPts val="650"/>
+              </a:spcAft>
+              <a:buSzPct val="120000"/>
+              <a:buFont typeface="Arial" panose="020B0604020202020204" pitchFamily="34" charset="0"/>
+              <a:buChar char="•"/>
+              <a:tabLst/>
+              <a:defRPr sz="2000" b="0" kern="1200">
+                <a:solidFill>
+                  <a:schemeClr val="tx1"/>
+                </a:solidFill>
+                <a:latin typeface="Montserrat" pitchFamily="2" charset="77"/>
+                <a:ea typeface="+mn-ea"/>
+                <a:cs typeface="+mn-cs"/>
+              </a:defRPr>
+            </a:lvl4pPr>
+            <a:lvl5pPr marL="180000" indent="-180000" algn="l" defTabSz="914400" rtl="0" eaLnBrk="1" latinLnBrk="0" hangingPunct="1">
+              <a:lnSpc>
+                <a:spcPct val="100000"/>
+              </a:lnSpc>
+              <a:spcBef>
+                <a:spcPts val="0"/>
+              </a:spcBef>
+              <a:spcAft>
+                <a:spcPts val="650"/>
+              </a:spcAft>
+              <a:buSzPct val="125000"/>
+              <a:buFont typeface="Arial" panose="020B0604020202020204" pitchFamily="34" charset="0"/>
+              <a:buChar char="•"/>
+              <a:tabLst/>
+              <a:defRPr sz="2000" b="0" kern="1200">
+                <a:solidFill>
+                  <a:schemeClr val="tx1"/>
+                </a:solidFill>
+                <a:latin typeface="Montserrat" pitchFamily="2" charset="77"/>
+                <a:ea typeface="+mn-ea"/>
+                <a:cs typeface="+mn-cs"/>
+              </a:defRPr>
+            </a:lvl5pPr>
+            <a:lvl6pPr marL="2514600" indent="-228600" algn="l" defTabSz="914400" rtl="0" eaLnBrk="1" latinLnBrk="0" hangingPunct="1">
+              <a:lnSpc>
+                <a:spcPct val="90000"/>
+              </a:lnSpc>
+              <a:spcBef>
+                <a:spcPts val="500"/>
+              </a:spcBef>
+              <a:buFont typeface="Arial" panose="020B0604020202020204" pitchFamily="34" charset="0"/>
+              <a:buChar char="•"/>
+              <a:defRPr sz="1800" kern="1200">
+                <a:solidFill>
+                  <a:schemeClr val="tx1"/>
+                </a:solidFill>
+                <a:latin typeface="+mn-lt"/>
+                <a:ea typeface="+mn-ea"/>
+                <a:cs typeface="+mn-cs"/>
+              </a:defRPr>
+            </a:lvl6pPr>
+            <a:lvl7pPr marL="2971800" indent="-228600" algn="l" defTabSz="914400" rtl="0" eaLnBrk="1" latinLnBrk="0" hangingPunct="1">
+              <a:lnSpc>
+                <a:spcPct val="90000"/>
+              </a:lnSpc>
+              <a:spcBef>
+                <a:spcPts val="500"/>
+              </a:spcBef>
+              <a:buFont typeface="Arial" panose="020B0604020202020204" pitchFamily="34" charset="0"/>
+              <a:buChar char="•"/>
+              <a:defRPr sz="1800" kern="1200">
+                <a:solidFill>
+                  <a:schemeClr val="tx1"/>
+                </a:solidFill>
+                <a:latin typeface="+mn-lt"/>
+                <a:ea typeface="+mn-ea"/>
+                <a:cs typeface="+mn-cs"/>
+              </a:defRPr>
+            </a:lvl7pPr>
+            <a:lvl8pPr marL="3429000" indent="-228600" algn="l" defTabSz="914400" rtl="0" eaLnBrk="1" latinLnBrk="0" hangingPunct="1">
+              <a:lnSpc>
+                <a:spcPct val="90000"/>
+              </a:lnSpc>
+              <a:spcBef>
+                <a:spcPts val="500"/>
+              </a:spcBef>
+              <a:buFont typeface="Arial" panose="020B0604020202020204" pitchFamily="34" charset="0"/>
+              <a:buChar char="•"/>
+              <a:defRPr sz="1800" kern="1200">
+                <a:solidFill>
+                  <a:schemeClr val="tx1"/>
+                </a:solidFill>
+                <a:latin typeface="+mn-lt"/>
+                <a:ea typeface="+mn-ea"/>
+                <a:cs typeface="+mn-cs"/>
+              </a:defRPr>
+            </a:lvl8pPr>
+            <a:lvl9pPr marL="3886200" indent="-228600" algn="l" defTabSz="914400" rtl="0" eaLnBrk="1" latinLnBrk="0" hangingPunct="1">
+              <a:lnSpc>
+                <a:spcPct val="90000"/>
+              </a:lnSpc>
+              <a:spcBef>
+                <a:spcPts val="500"/>
+              </a:spcBef>
+              <a:buFont typeface="Arial" panose="020B0604020202020204" pitchFamily="34" charset="0"/>
+              <a:buChar char="•"/>
+              <a:defRPr sz="1800" kern="1200">
+                <a:solidFill>
+                  <a:schemeClr val="tx1"/>
+                </a:solidFill>
+                <a:latin typeface="+mn-lt"/>
+                <a:ea typeface="+mn-ea"/>
+                <a:cs typeface="+mn-cs"/>
+              </a:defRPr>
+            </a:lvl9pPr>
+          </a:lstStyle>
+          <a:p>
+            <a:endParaRPr lang="en-GB" dirty="0"/>
+          </a:p>
+          <a:p>
+            <a:endParaRPr lang="en-GB" dirty="0"/>
+          </a:p>
+          <a:p>
+            <a:endParaRPr lang="en-GB" dirty="0"/>
+          </a:p>
+          <a:p>
+            <a:endParaRPr lang="en-GB" dirty="0"/>
+          </a:p>
+          <a:p>
+            <a:endParaRPr lang="en-GB" dirty="0"/>
+          </a:p>
+          <a:p>
+            <a:endParaRPr lang="en-GB" dirty="0"/>
+          </a:p>
+        </p:txBody>
+      </p:sp>
+      <p:pic>
+        <p:nvPicPr>
+          <p:cNvPr id="5" name="Picture 4">
+            <a:extLst>
+              <a:ext uri="{FF2B5EF4-FFF2-40B4-BE49-F238E27FC236}">
+                <a16:creationId xmlns:a16="http://schemas.microsoft.com/office/drawing/2014/main" id="{49298CC5-A8B7-0DD7-5A74-4C167E6D2826}"/>
+              </a:ext>
+            </a:extLst>
+          </p:cNvPr>
+          <p:cNvPicPr>
+            <a:picLocks noChangeAspect="1"/>
+          </p:cNvPicPr>
+          <p:nvPr/>
+        </p:nvPicPr>
+        <p:blipFill>
+          <a:blip r:embed="rId3"/>
+          <a:stretch>
+            <a:fillRect/>
+          </a:stretch>
+        </p:blipFill>
+        <p:spPr>
+          <a:xfrm>
+            <a:off x="6174042" y="804714"/>
+            <a:ext cx="5621514" cy="2440994"/>
+          </a:xfrm>
+          <a:prstGeom prst="rect">
+            <a:avLst/>
+          </a:prstGeom>
+          <a:ln>
+            <a:solidFill>
+              <a:schemeClr val="tx1"/>
+            </a:solidFill>
+          </a:ln>
+        </p:spPr>
+      </p:pic>
+      <p:pic>
+        <p:nvPicPr>
+          <p:cNvPr id="9" name="Picture 8">
+            <a:extLst>
+              <a:ext uri="{FF2B5EF4-FFF2-40B4-BE49-F238E27FC236}">
+                <a16:creationId xmlns:a16="http://schemas.microsoft.com/office/drawing/2014/main" id="{5366B8EA-CB3B-8FE4-B367-F99F788E1503}"/>
+              </a:ext>
+            </a:extLst>
+          </p:cNvPr>
+          <p:cNvPicPr>
+            <a:picLocks noChangeAspect="1"/>
+          </p:cNvPicPr>
+          <p:nvPr/>
+        </p:nvPicPr>
+        <p:blipFill>
+          <a:blip r:embed="rId4"/>
+          <a:stretch>
+            <a:fillRect/>
+          </a:stretch>
+        </p:blipFill>
+        <p:spPr>
+          <a:xfrm>
+            <a:off x="6146882" y="3760210"/>
+            <a:ext cx="5648674" cy="2440994"/>
+          </a:xfrm>
+          <a:prstGeom prst="rect">
+            <a:avLst/>
+          </a:prstGeom>
+          <a:ln>
+            <a:solidFill>
+              <a:schemeClr val="tx1"/>
+            </a:solidFill>
+          </a:ln>
+        </p:spPr>
+      </p:pic>
+    </p:spTree>
+    <p:extLst>
+      <p:ext uri="{BB962C8B-B14F-4D97-AF65-F5344CB8AC3E}">
+        <p14:creationId xmlns:p14="http://schemas.microsoft.com/office/powerpoint/2010/main" val="1314134963"/>
+      </p:ext>
+    </p:extLst>
+  </p:cSld>
+  <p:clrMapOvr>
+    <a:masterClrMapping/>
+  </p:clrMapOvr>
+</p:sld>
+</file>
+
+<file path=ppt/slides/slide29.xml><?xml version="1.0" encoding="utf-8"?>
 <p:sld xmlns:a="http://schemas.openxmlformats.org/drawingml/2006/main" xmlns:r="http://schemas.openxmlformats.org/officeDocument/2006/relationships" xmlns:p="http://schemas.openxmlformats.org/presentationml/2006/main">
   <p:cSld>
     <p:spTree>
@@ -37018,7 +39010,7 @@
             <a:fld id="{EF892D59-8F09-EF4B-AD6D-DA609442F868}" type="slidenum">
               <a:rPr lang="en-GB" smtClean="0"/>
               <a:pPr/>
-              <a:t>25</a:t>
+              <a:t>29</a:t>
             </a:fld>
             <a:endParaRPr lang="en-GB" dirty="0"/>
           </a:p>
@@ -37343,7 +39335,70 @@
 </p:sld>
 </file>
 
-<file path=ppt/slides/slide26.xml><?xml version="1.0" encoding="utf-8"?>
+<file path=ppt/slides/slide3.xml><?xml version="1.0" encoding="utf-8"?>
+<p:sld xmlns:a="http://schemas.openxmlformats.org/drawingml/2006/main" xmlns:r="http://schemas.openxmlformats.org/officeDocument/2006/relationships" xmlns:p="http://schemas.openxmlformats.org/presentationml/2006/main">
+  <p:cSld>
+    <p:spTree>
+      <p:nvGrpSpPr>
+        <p:cNvPr id="1" name=""/>
+        <p:cNvGrpSpPr/>
+        <p:nvPr/>
+      </p:nvGrpSpPr>
+      <p:grpSpPr>
+        <a:xfrm>
+          <a:off x="0" y="0"/>
+          <a:ext cx="0" cy="0"/>
+          <a:chOff x="0" y="0"/>
+          <a:chExt cx="0" cy="0"/>
+        </a:xfrm>
+      </p:grpSpPr>
+      <p:sp>
+        <p:nvSpPr>
+          <p:cNvPr id="2" name="Title 1">
+            <a:extLst>
+              <a:ext uri="{FF2B5EF4-FFF2-40B4-BE49-F238E27FC236}">
+                <a16:creationId xmlns:a16="http://schemas.microsoft.com/office/drawing/2014/main" id="{D433C2BF-19C4-2546-010E-A37F8EA4CDC0}"/>
+              </a:ext>
+            </a:extLst>
+          </p:cNvPr>
+          <p:cNvSpPr>
+            <a:spLocks noGrp="1"/>
+          </p:cNvSpPr>
+          <p:nvPr>
+            <p:ph type="ctrTitle"/>
+          </p:nvPr>
+        </p:nvSpPr>
+        <p:spPr>
+          <a:xfrm>
+            <a:off x="376239" y="1477925"/>
+            <a:ext cx="5810250" cy="1090651"/>
+          </a:xfrm>
+        </p:spPr>
+        <p:txBody>
+          <a:bodyPr/>
+          <a:lstStyle/>
+          <a:p>
+            <a:r>
+              <a:rPr lang="en-GB" dirty="0"/>
+              <a:t>Clean Code and Best Practice</a:t>
+            </a:r>
+          </a:p>
+        </p:txBody>
+      </p:sp>
+    </p:spTree>
+    <p:extLst>
+      <p:ext uri="{BB962C8B-B14F-4D97-AF65-F5344CB8AC3E}">
+        <p14:creationId xmlns:p14="http://schemas.microsoft.com/office/powerpoint/2010/main" val="662172867"/>
+      </p:ext>
+    </p:extLst>
+  </p:cSld>
+  <p:clrMapOvr>
+    <a:masterClrMapping/>
+  </p:clrMapOvr>
+</p:sld>
+</file>
+
+<file path=ppt/slides/slide30.xml><?xml version="1.0" encoding="utf-8"?>
 <p:sld xmlns:a="http://schemas.openxmlformats.org/drawingml/2006/main" xmlns:r="http://schemas.openxmlformats.org/officeDocument/2006/relationships" xmlns:p="http://schemas.openxmlformats.org/presentationml/2006/main">
   <p:cSld>
     <p:spTree>
@@ -37417,7 +39472,7 @@
             <a:fld id="{EF892D59-8F09-EF4B-AD6D-DA609442F868}" type="slidenum">
               <a:rPr lang="en-GB" smtClean="0"/>
               <a:pPr/>
-              <a:t>26</a:t>
+              <a:t>30</a:t>
             </a:fld>
             <a:endParaRPr lang="en-GB" dirty="0"/>
           </a:p>
@@ -37896,7 +39951,7 @@
 </p:sld>
 </file>
 
-<file path=ppt/slides/slide27.xml><?xml version="1.0" encoding="utf-8"?>
+<file path=ppt/slides/slide31.xml><?xml version="1.0" encoding="utf-8"?>
 <p:sld xmlns:a="http://schemas.openxmlformats.org/drawingml/2006/main" xmlns:r="http://schemas.openxmlformats.org/officeDocument/2006/relationships" xmlns:p="http://schemas.openxmlformats.org/presentationml/2006/main">
   <p:cSld>
     <p:spTree>
@@ -37970,7 +40025,7 @@
             <a:fld id="{EF892D59-8F09-EF4B-AD6D-DA609442F868}" type="slidenum">
               <a:rPr lang="en-GB" smtClean="0"/>
               <a:pPr/>
-              <a:t>27</a:t>
+              <a:t>31</a:t>
             </a:fld>
             <a:endParaRPr lang="en-GB" dirty="0"/>
           </a:p>
@@ -38249,7 +40304,7 @@
 </p:sld>
 </file>
 
-<file path=ppt/slides/slide28.xml><?xml version="1.0" encoding="utf-8"?>
+<file path=ppt/slides/slide32.xml><?xml version="1.0" encoding="utf-8"?>
 <p:sld xmlns:a="http://schemas.openxmlformats.org/drawingml/2006/main" xmlns:r="http://schemas.openxmlformats.org/officeDocument/2006/relationships" xmlns:p="http://schemas.openxmlformats.org/presentationml/2006/main">
   <p:cSld>
     <p:spTree>
@@ -38323,7 +40378,7 @@
             <a:fld id="{EF892D59-8F09-EF4B-AD6D-DA609442F868}" type="slidenum">
               <a:rPr lang="en-GB" smtClean="0"/>
               <a:pPr/>
-              <a:t>28</a:t>
+              <a:t>32</a:t>
             </a:fld>
             <a:endParaRPr lang="en-GB" dirty="0"/>
           </a:p>
@@ -38599,7 +40654,7 @@
 </p:sld>
 </file>
 
-<file path=ppt/slides/slide29.xml><?xml version="1.0" encoding="utf-8"?>
+<file path=ppt/slides/slide33.xml><?xml version="1.0" encoding="utf-8"?>
 <p:sld xmlns:a="http://schemas.openxmlformats.org/drawingml/2006/main" xmlns:r="http://schemas.openxmlformats.org/officeDocument/2006/relationships" xmlns:p="http://schemas.openxmlformats.org/presentationml/2006/main">
   <p:cSld>
     <p:spTree>
@@ -38673,7 +40728,7 @@
             <a:fld id="{EF892D59-8F09-EF4B-AD6D-DA609442F868}" type="slidenum">
               <a:rPr lang="en-GB" smtClean="0"/>
               <a:pPr/>
-              <a:t>29</a:t>
+              <a:t>33</a:t>
             </a:fld>
             <a:endParaRPr lang="en-GB" dirty="0"/>
           </a:p>
@@ -38968,70 +41023,7 @@
 </p:sld>
 </file>
 
-<file path=ppt/slides/slide3.xml><?xml version="1.0" encoding="utf-8"?>
-<p:sld xmlns:a="http://schemas.openxmlformats.org/drawingml/2006/main" xmlns:r="http://schemas.openxmlformats.org/officeDocument/2006/relationships" xmlns:p="http://schemas.openxmlformats.org/presentationml/2006/main">
-  <p:cSld>
-    <p:spTree>
-      <p:nvGrpSpPr>
-        <p:cNvPr id="1" name=""/>
-        <p:cNvGrpSpPr/>
-        <p:nvPr/>
-      </p:nvGrpSpPr>
-      <p:grpSpPr>
-        <a:xfrm>
-          <a:off x="0" y="0"/>
-          <a:ext cx="0" cy="0"/>
-          <a:chOff x="0" y="0"/>
-          <a:chExt cx="0" cy="0"/>
-        </a:xfrm>
-      </p:grpSpPr>
-      <p:sp>
-        <p:nvSpPr>
-          <p:cNvPr id="2" name="Title 1">
-            <a:extLst>
-              <a:ext uri="{FF2B5EF4-FFF2-40B4-BE49-F238E27FC236}">
-                <a16:creationId xmlns:a16="http://schemas.microsoft.com/office/drawing/2014/main" id="{D433C2BF-19C4-2546-010E-A37F8EA4CDC0}"/>
-              </a:ext>
-            </a:extLst>
-          </p:cNvPr>
-          <p:cNvSpPr>
-            <a:spLocks noGrp="1"/>
-          </p:cNvSpPr>
-          <p:nvPr>
-            <p:ph type="ctrTitle"/>
-          </p:nvPr>
-        </p:nvSpPr>
-        <p:spPr>
-          <a:xfrm>
-            <a:off x="376239" y="1477925"/>
-            <a:ext cx="5810250" cy="1090651"/>
-          </a:xfrm>
-        </p:spPr>
-        <p:txBody>
-          <a:bodyPr/>
-          <a:lstStyle/>
-          <a:p>
-            <a:r>
-              <a:rPr lang="en-GB" dirty="0"/>
-              <a:t>Clean Code and Best Practice</a:t>
-            </a:r>
-          </a:p>
-        </p:txBody>
-      </p:sp>
-    </p:spTree>
-    <p:extLst>
-      <p:ext uri="{BB962C8B-B14F-4D97-AF65-F5344CB8AC3E}">
-        <p14:creationId xmlns:p14="http://schemas.microsoft.com/office/powerpoint/2010/main" val="662172867"/>
-      </p:ext>
-    </p:extLst>
-  </p:cSld>
-  <p:clrMapOvr>
-    <a:masterClrMapping/>
-  </p:clrMapOvr>
-</p:sld>
-</file>
-
-<file path=ppt/slides/slide30.xml><?xml version="1.0" encoding="utf-8"?>
+<file path=ppt/slides/slide34.xml><?xml version="1.0" encoding="utf-8"?>
 <p:sld xmlns:a="http://schemas.openxmlformats.org/drawingml/2006/main" xmlns:r="http://schemas.openxmlformats.org/officeDocument/2006/relationships" xmlns:p="http://schemas.openxmlformats.org/presentationml/2006/main">
   <p:cSld>
     <p:spTree>
@@ -39105,7 +41097,7 @@
             <a:fld id="{EF892D59-8F09-EF4B-AD6D-DA609442F868}" type="slidenum">
               <a:rPr lang="en-GB" smtClean="0"/>
               <a:pPr/>
-              <a:t>30</a:t>
+              <a:t>34</a:t>
             </a:fld>
             <a:endParaRPr lang="en-GB" dirty="0"/>
           </a:p>
@@ -39517,7 +41509,7 @@
 </p:sld>
 </file>
 
-<file path=ppt/slides/slide31.xml><?xml version="1.0" encoding="utf-8"?>
+<file path=ppt/slides/slide35.xml><?xml version="1.0" encoding="utf-8"?>
 <p:sld xmlns:a="http://schemas.openxmlformats.org/drawingml/2006/main" xmlns:r="http://schemas.openxmlformats.org/officeDocument/2006/relationships" xmlns:p="http://schemas.openxmlformats.org/presentationml/2006/main">
   <p:cSld>
     <p:spTree>
@@ -39591,7 +41583,7 @@
             <a:fld id="{EF892D59-8F09-EF4B-AD6D-DA609442F868}" type="slidenum">
               <a:rPr lang="en-GB" smtClean="0"/>
               <a:pPr/>
-              <a:t>31</a:t>
+              <a:t>35</a:t>
             </a:fld>
             <a:endParaRPr lang="en-GB" dirty="0"/>
           </a:p>
@@ -40046,7 +42038,7 @@
 </p:sld>
 </file>
 
-<file path=ppt/slides/slide32.xml><?xml version="1.0" encoding="utf-8"?>
+<file path=ppt/slides/slide36.xml><?xml version="1.0" encoding="utf-8"?>
 <p:sld xmlns:a="http://schemas.openxmlformats.org/drawingml/2006/main" xmlns:r="http://schemas.openxmlformats.org/officeDocument/2006/relationships" xmlns:p="http://schemas.openxmlformats.org/presentationml/2006/main">
   <p:cSld>
     <p:spTree>
@@ -40120,7 +42112,7 @@
             <a:fld id="{EF892D59-8F09-EF4B-AD6D-DA609442F868}" type="slidenum">
               <a:rPr lang="en-GB" smtClean="0"/>
               <a:pPr/>
-              <a:t>32</a:t>
+              <a:t>36</a:t>
             </a:fld>
             <a:endParaRPr lang="en-GB" dirty="0"/>
           </a:p>
@@ -40432,7 +42424,7 @@
 </p:sld>
 </file>
 
-<file path=ppt/slides/slide33.xml><?xml version="1.0" encoding="utf-8"?>
+<file path=ppt/slides/slide37.xml><?xml version="1.0" encoding="utf-8"?>
 <p:sld xmlns:a="http://schemas.openxmlformats.org/drawingml/2006/main" xmlns:r="http://schemas.openxmlformats.org/officeDocument/2006/relationships" xmlns:p="http://schemas.openxmlformats.org/presentationml/2006/main">
   <p:cSld>
     <p:spTree>
@@ -40501,7 +42493,7 @@
 </p:sld>
 </file>
 
-<file path=ppt/slides/slide34.xml><?xml version="1.0" encoding="utf-8"?>
+<file path=ppt/slides/slide38.xml><?xml version="1.0" encoding="utf-8"?>
 <p:sld xmlns:a="http://schemas.openxmlformats.org/drawingml/2006/main" xmlns:r="http://schemas.openxmlformats.org/officeDocument/2006/relationships" xmlns:p="http://schemas.openxmlformats.org/presentationml/2006/main">
   <p:cSld>
     <p:spTree>
@@ -40581,7 +42573,7 @@
             <a:fld id="{EF892D59-8F09-EF4B-AD6D-DA609442F868}" type="slidenum">
               <a:rPr lang="en-GB" smtClean="0"/>
               <a:pPr/>
-              <a:t>34</a:t>
+              <a:t>38</a:t>
             </a:fld>
             <a:endParaRPr lang="en-GB" dirty="0"/>
           </a:p>
@@ -41106,7 +43098,7 @@
 </p:sld>
 </file>
 
-<file path=ppt/slides/slide35.xml><?xml version="1.0" encoding="utf-8"?>
+<file path=ppt/slides/slide39.xml><?xml version="1.0" encoding="utf-8"?>
 <p:sld xmlns:a="http://schemas.openxmlformats.org/drawingml/2006/main" xmlns:r="http://schemas.openxmlformats.org/officeDocument/2006/relationships" xmlns:p="http://schemas.openxmlformats.org/presentationml/2006/main">
   <p:cSld>
     <p:spTree>
@@ -41186,7 +43178,7 @@
             <a:fld id="{EF892D59-8F09-EF4B-AD6D-DA609442F868}" type="slidenum">
               <a:rPr lang="en-GB" smtClean="0"/>
               <a:pPr/>
-              <a:t>35</a:t>
+              <a:t>39</a:t>
             </a:fld>
             <a:endParaRPr lang="en-GB" dirty="0"/>
           </a:p>
@@ -41711,7 +43703,351 @@
 </p:sld>
 </file>
 
-<file path=ppt/slides/slide36.xml><?xml version="1.0" encoding="utf-8"?>
+<file path=ppt/slides/slide4.xml><?xml version="1.0" encoding="utf-8"?>
+<p:sld xmlns:a="http://schemas.openxmlformats.org/drawingml/2006/main" xmlns:r="http://schemas.openxmlformats.org/officeDocument/2006/relationships" xmlns:p="http://schemas.openxmlformats.org/presentationml/2006/main">
+  <p:cSld>
+    <p:spTree>
+      <p:nvGrpSpPr>
+        <p:cNvPr id="1" name=""/>
+        <p:cNvGrpSpPr/>
+        <p:nvPr/>
+      </p:nvGrpSpPr>
+      <p:grpSpPr>
+        <a:xfrm>
+          <a:off x="0" y="0"/>
+          <a:ext cx="0" cy="0"/>
+          <a:chOff x="0" y="0"/>
+          <a:chExt cx="0" cy="0"/>
+        </a:xfrm>
+      </p:grpSpPr>
+      <p:sp>
+        <p:nvSpPr>
+          <p:cNvPr id="2" name="Text Placeholder 1">
+            <a:extLst>
+              <a:ext uri="{FF2B5EF4-FFF2-40B4-BE49-F238E27FC236}">
+                <a16:creationId xmlns:a16="http://schemas.microsoft.com/office/drawing/2014/main" id="{6A65CFF8-8B9F-7508-C924-1B9C02A476E1}"/>
+              </a:ext>
+            </a:extLst>
+          </p:cNvPr>
+          <p:cNvSpPr>
+            <a:spLocks noGrp="1"/>
+          </p:cNvSpPr>
+          <p:nvPr>
+            <p:ph type="body" sz="quarter" idx="10"/>
+          </p:nvPr>
+        </p:nvSpPr>
+        <p:spPr>
+          <a:xfrm>
+            <a:off x="375629" y="2744921"/>
+            <a:ext cx="3694112" cy="730876"/>
+          </a:xfrm>
+        </p:spPr>
+        <p:txBody>
+          <a:bodyPr/>
+          <a:lstStyle/>
+          <a:p>
+            <a:r>
+              <a:rPr lang="en-GB" dirty="0"/>
+              <a:t>Recaps</a:t>
+            </a:r>
+          </a:p>
+        </p:txBody>
+      </p:sp>
+      <p:sp>
+        <p:nvSpPr>
+          <p:cNvPr id="4" name="Slide Number Placeholder 3">
+            <a:extLst>
+              <a:ext uri="{FF2B5EF4-FFF2-40B4-BE49-F238E27FC236}">
+                <a16:creationId xmlns:a16="http://schemas.microsoft.com/office/drawing/2014/main" id="{DEDA150B-8C2F-AC70-0E82-BD6B71D071CE}"/>
+              </a:ext>
+            </a:extLst>
+          </p:cNvPr>
+          <p:cNvSpPr>
+            <a:spLocks noGrp="1"/>
+          </p:cNvSpPr>
+          <p:nvPr>
+            <p:ph type="sldNum" sz="quarter" idx="4"/>
+          </p:nvPr>
+        </p:nvSpPr>
+        <p:spPr/>
+        <p:txBody>
+          <a:bodyPr/>
+          <a:lstStyle/>
+          <a:p>
+            <a:fld id="{EF892D59-8F09-EF4B-AD6D-DA609442F868}" type="slidenum">
+              <a:rPr lang="en-GB" smtClean="0"/>
+              <a:pPr/>
+              <a:t>4</a:t>
+            </a:fld>
+            <a:endParaRPr lang="en-GB" dirty="0"/>
+          </a:p>
+        </p:txBody>
+      </p:sp>
+      <p:sp>
+        <p:nvSpPr>
+          <p:cNvPr id="5" name="Text Placeholder 5">
+            <a:extLst>
+              <a:ext uri="{FF2B5EF4-FFF2-40B4-BE49-F238E27FC236}">
+                <a16:creationId xmlns:a16="http://schemas.microsoft.com/office/drawing/2014/main" id="{B27DF1F9-9AA4-AF42-EE90-C471C4AE44DF}"/>
+              </a:ext>
+            </a:extLst>
+          </p:cNvPr>
+          <p:cNvSpPr txBox="1">
+            <a:spLocks/>
+          </p:cNvSpPr>
+          <p:nvPr/>
+        </p:nvSpPr>
+        <p:spPr>
+          <a:xfrm>
+            <a:off x="5612701" y="494246"/>
+            <a:ext cx="6036461" cy="3007779"/>
+          </a:xfrm>
+          <a:prstGeom prst="rect">
+            <a:avLst/>
+          </a:prstGeom>
+        </p:spPr>
+        <p:txBody>
+          <a:bodyPr vert="horz" lIns="0" tIns="0" rIns="0" bIns="0" rtlCol="0" anchor="t" anchorCtr="0">
+            <a:noAutofit/>
+          </a:bodyPr>
+          <a:lstStyle>
+            <a:lvl1pPr marL="0" indent="0" algn="l" defTabSz="914400" rtl="0" eaLnBrk="1" latinLnBrk="0" hangingPunct="1">
+              <a:lnSpc>
+                <a:spcPct val="100000"/>
+              </a:lnSpc>
+              <a:spcBef>
+                <a:spcPts val="0"/>
+              </a:spcBef>
+              <a:spcAft>
+                <a:spcPts val="650"/>
+              </a:spcAft>
+              <a:buSzPct val="115000"/>
+              <a:buFont typeface="Arial" panose="020B0604020202020204" pitchFamily="34" charset="0"/>
+              <a:buNone/>
+              <a:defRPr sz="2000" b="0" i="0" kern="1200">
+                <a:solidFill>
+                  <a:schemeClr val="tx1"/>
+                </a:solidFill>
+                <a:latin typeface="Montserrat" pitchFamily="2" charset="77"/>
+                <a:ea typeface="+mn-ea"/>
+                <a:cs typeface="+mn-cs"/>
+              </a:defRPr>
+            </a:lvl1pPr>
+            <a:lvl2pPr marL="180000" marR="0" indent="-180000" algn="l" defTabSz="914400" rtl="0" eaLnBrk="1" fontAlgn="auto" latinLnBrk="0" hangingPunct="1">
+              <a:lnSpc>
+                <a:spcPct val="100000"/>
+              </a:lnSpc>
+              <a:spcBef>
+                <a:spcPts val="0"/>
+              </a:spcBef>
+              <a:spcAft>
+                <a:spcPts val="1200"/>
+              </a:spcAft>
+              <a:buClrTx/>
+              <a:buSzPct val="125000"/>
+              <a:buFont typeface="Arial" panose="020B0604020202020204" pitchFamily="34" charset="0"/>
+              <a:buChar char="•"/>
+              <a:tabLst/>
+              <a:defRPr sz="2000" b="0" kern="1200">
+                <a:solidFill>
+                  <a:schemeClr val="tx1"/>
+                </a:solidFill>
+                <a:latin typeface="Montserrat" pitchFamily="2" charset="77"/>
+                <a:ea typeface="+mn-ea"/>
+                <a:cs typeface="+mn-cs"/>
+              </a:defRPr>
+            </a:lvl2pPr>
+            <a:lvl3pPr marL="180000" indent="-180000" algn="l" defTabSz="914400" rtl="0" eaLnBrk="1" latinLnBrk="0" hangingPunct="1">
+              <a:lnSpc>
+                <a:spcPct val="100000"/>
+              </a:lnSpc>
+              <a:spcBef>
+                <a:spcPts val="0"/>
+              </a:spcBef>
+              <a:spcAft>
+                <a:spcPts val="650"/>
+              </a:spcAft>
+              <a:buSzPct val="120000"/>
+              <a:buFont typeface="Arial" panose="020B0604020202020204" pitchFamily="34" charset="0"/>
+              <a:buChar char="•"/>
+              <a:tabLst/>
+              <a:defRPr sz="2000" b="0" i="0" kern="1200">
+                <a:solidFill>
+                  <a:schemeClr val="tx1"/>
+                </a:solidFill>
+                <a:latin typeface="Montserrat" pitchFamily="2" charset="77"/>
+                <a:ea typeface="+mn-ea"/>
+                <a:cs typeface="+mn-cs"/>
+              </a:defRPr>
+            </a:lvl3pPr>
+            <a:lvl4pPr marL="180000" indent="-180000" algn="l" defTabSz="914400" rtl="0" eaLnBrk="1" latinLnBrk="0" hangingPunct="1">
+              <a:lnSpc>
+                <a:spcPct val="100000"/>
+              </a:lnSpc>
+              <a:spcBef>
+                <a:spcPts val="0"/>
+              </a:spcBef>
+              <a:spcAft>
+                <a:spcPts val="650"/>
+              </a:spcAft>
+              <a:buSzPct val="120000"/>
+              <a:buFont typeface="Arial" panose="020B0604020202020204" pitchFamily="34" charset="0"/>
+              <a:buChar char="•"/>
+              <a:tabLst/>
+              <a:defRPr sz="2000" b="0" kern="1200">
+                <a:solidFill>
+                  <a:schemeClr val="tx1"/>
+                </a:solidFill>
+                <a:latin typeface="Montserrat" pitchFamily="2" charset="77"/>
+                <a:ea typeface="+mn-ea"/>
+                <a:cs typeface="+mn-cs"/>
+              </a:defRPr>
+            </a:lvl4pPr>
+            <a:lvl5pPr marL="180000" indent="-180000" algn="l" defTabSz="914400" rtl="0" eaLnBrk="1" latinLnBrk="0" hangingPunct="1">
+              <a:lnSpc>
+                <a:spcPct val="100000"/>
+              </a:lnSpc>
+              <a:spcBef>
+                <a:spcPts val="0"/>
+              </a:spcBef>
+              <a:spcAft>
+                <a:spcPts val="650"/>
+              </a:spcAft>
+              <a:buSzPct val="125000"/>
+              <a:buFont typeface="Arial" panose="020B0604020202020204" pitchFamily="34" charset="0"/>
+              <a:buChar char="•"/>
+              <a:tabLst/>
+              <a:defRPr sz="2000" b="0" kern="1200">
+                <a:solidFill>
+                  <a:schemeClr val="tx1"/>
+                </a:solidFill>
+                <a:latin typeface="Montserrat" pitchFamily="2" charset="77"/>
+                <a:ea typeface="+mn-ea"/>
+                <a:cs typeface="+mn-cs"/>
+              </a:defRPr>
+            </a:lvl5pPr>
+            <a:lvl6pPr marL="2514600" indent="-228600" algn="l" defTabSz="914400" rtl="0" eaLnBrk="1" latinLnBrk="0" hangingPunct="1">
+              <a:lnSpc>
+                <a:spcPct val="90000"/>
+              </a:lnSpc>
+              <a:spcBef>
+                <a:spcPts val="500"/>
+              </a:spcBef>
+              <a:buFont typeface="Arial" panose="020B0604020202020204" pitchFamily="34" charset="0"/>
+              <a:buChar char="•"/>
+              <a:defRPr sz="1800" kern="1200">
+                <a:solidFill>
+                  <a:schemeClr val="tx1"/>
+                </a:solidFill>
+                <a:latin typeface="+mn-lt"/>
+                <a:ea typeface="+mn-ea"/>
+                <a:cs typeface="+mn-cs"/>
+              </a:defRPr>
+            </a:lvl6pPr>
+            <a:lvl7pPr marL="2971800" indent="-228600" algn="l" defTabSz="914400" rtl="0" eaLnBrk="1" latinLnBrk="0" hangingPunct="1">
+              <a:lnSpc>
+                <a:spcPct val="90000"/>
+              </a:lnSpc>
+              <a:spcBef>
+                <a:spcPts val="500"/>
+              </a:spcBef>
+              <a:buFont typeface="Arial" panose="020B0604020202020204" pitchFamily="34" charset="0"/>
+              <a:buChar char="•"/>
+              <a:defRPr sz="1800" kern="1200">
+                <a:solidFill>
+                  <a:schemeClr val="tx1"/>
+                </a:solidFill>
+                <a:latin typeface="+mn-lt"/>
+                <a:ea typeface="+mn-ea"/>
+                <a:cs typeface="+mn-cs"/>
+              </a:defRPr>
+            </a:lvl7pPr>
+            <a:lvl8pPr marL="3429000" indent="-228600" algn="l" defTabSz="914400" rtl="0" eaLnBrk="1" latinLnBrk="0" hangingPunct="1">
+              <a:lnSpc>
+                <a:spcPct val="90000"/>
+              </a:lnSpc>
+              <a:spcBef>
+                <a:spcPts val="500"/>
+              </a:spcBef>
+              <a:buFont typeface="Arial" panose="020B0604020202020204" pitchFamily="34" charset="0"/>
+              <a:buChar char="•"/>
+              <a:defRPr sz="1800" kern="1200">
+                <a:solidFill>
+                  <a:schemeClr val="tx1"/>
+                </a:solidFill>
+                <a:latin typeface="+mn-lt"/>
+                <a:ea typeface="+mn-ea"/>
+                <a:cs typeface="+mn-cs"/>
+              </a:defRPr>
+            </a:lvl8pPr>
+            <a:lvl9pPr marL="3886200" indent="-228600" algn="l" defTabSz="914400" rtl="0" eaLnBrk="1" latinLnBrk="0" hangingPunct="1">
+              <a:lnSpc>
+                <a:spcPct val="90000"/>
+              </a:lnSpc>
+              <a:spcBef>
+                <a:spcPts val="500"/>
+              </a:spcBef>
+              <a:buFont typeface="Arial" panose="020B0604020202020204" pitchFamily="34" charset="0"/>
+              <a:buChar char="•"/>
+              <a:defRPr sz="1800" kern="1200">
+                <a:solidFill>
+                  <a:schemeClr val="tx1"/>
+                </a:solidFill>
+                <a:latin typeface="+mn-lt"/>
+                <a:ea typeface="+mn-ea"/>
+                <a:cs typeface="+mn-cs"/>
+              </a:defRPr>
+            </a:lvl9pPr>
+          </a:lstStyle>
+          <a:p>
+            <a:r>
+              <a:rPr lang="en-GB" dirty="0"/>
+              <a:t>We would have looked at these throughout the course and you have all demonstrated good coding practice. </a:t>
+            </a:r>
+          </a:p>
+          <a:p>
+            <a:endParaRPr lang="en-GB" dirty="0"/>
+          </a:p>
+          <a:p>
+            <a:r>
+              <a:rPr lang="en-GB" dirty="0"/>
+              <a:t>Looking and identifying the good practice explicitly will help you understand why you have done what you have done, how you have done it</a:t>
+            </a:r>
+          </a:p>
+          <a:p>
+            <a:endParaRPr lang="en-GB" dirty="0"/>
+          </a:p>
+          <a:p>
+            <a:endParaRPr lang="en-GB" dirty="0"/>
+          </a:p>
+          <a:p>
+            <a:endParaRPr lang="en-GB" dirty="0"/>
+          </a:p>
+          <a:p>
+            <a:endParaRPr lang="en-GB" dirty="0"/>
+          </a:p>
+          <a:p>
+            <a:endParaRPr lang="en-GB" dirty="0"/>
+          </a:p>
+          <a:p>
+            <a:endParaRPr lang="en-GB" dirty="0"/>
+          </a:p>
+        </p:txBody>
+      </p:sp>
+    </p:spTree>
+    <p:extLst>
+      <p:ext uri="{BB962C8B-B14F-4D97-AF65-F5344CB8AC3E}">
+        <p14:creationId xmlns:p14="http://schemas.microsoft.com/office/powerpoint/2010/main" val="2037995151"/>
+      </p:ext>
+    </p:extLst>
+  </p:cSld>
+  <p:clrMapOvr>
+    <a:masterClrMapping/>
+  </p:clrMapOvr>
+</p:sld>
+</file>
+
+<file path=ppt/slides/slide40.xml><?xml version="1.0" encoding="utf-8"?>
 <p:sld xmlns:a="http://schemas.openxmlformats.org/drawingml/2006/main" xmlns:r="http://schemas.openxmlformats.org/officeDocument/2006/relationships" xmlns:p="http://schemas.openxmlformats.org/presentationml/2006/main">
   <p:cSld>
     <p:spTree>
@@ -41758,7 +44094,7 @@
             <a:fld id="{EF892D59-8F09-EF4B-AD6D-DA609442F868}" type="slidenum">
               <a:rPr lang="en-GB" smtClean="0"/>
               <a:pPr/>
-              <a:t>36</a:t>
+              <a:t>40</a:t>
             </a:fld>
             <a:endParaRPr lang="en-GB" dirty="0"/>
           </a:p>
@@ -42516,7 +44852,7 @@
 </p:sld>
 </file>
 
-<file path=ppt/slides/slide37.xml><?xml version="1.0" encoding="utf-8"?>
+<file path=ppt/slides/slide41.xml><?xml version="1.0" encoding="utf-8"?>
 <p:sld xmlns:a="http://schemas.openxmlformats.org/drawingml/2006/main" xmlns:r="http://schemas.openxmlformats.org/officeDocument/2006/relationships" xmlns:p="http://schemas.openxmlformats.org/presentationml/2006/main">
   <p:cSld>
     <p:spTree>
@@ -42563,7 +44899,7 @@
             <a:fld id="{EF892D59-8F09-EF4B-AD6D-DA609442F868}" type="slidenum">
               <a:rPr lang="en-GB" smtClean="0"/>
               <a:pPr/>
-              <a:t>37</a:t>
+              <a:t>41</a:t>
             </a:fld>
             <a:endParaRPr lang="en-GB" dirty="0"/>
           </a:p>
@@ -43320,7 +45656,7 @@
 </p:sld>
 </file>
 
-<file path=ppt/slides/slide38.xml><?xml version="1.0" encoding="utf-8"?>
+<file path=ppt/slides/slide42.xml><?xml version="1.0" encoding="utf-8"?>
 <p:sld xmlns:a="http://schemas.openxmlformats.org/drawingml/2006/main" xmlns:r="http://schemas.openxmlformats.org/officeDocument/2006/relationships" xmlns:p="http://schemas.openxmlformats.org/presentationml/2006/main">
   <p:cSld>
     <p:spTree>
@@ -43367,7 +45703,7 @@
             <a:fld id="{EF892D59-8F09-EF4B-AD6D-DA609442F868}" type="slidenum">
               <a:rPr lang="en-GB" smtClean="0"/>
               <a:pPr/>
-              <a:t>38</a:t>
+              <a:t>42</a:t>
             </a:fld>
             <a:endParaRPr lang="en-GB" dirty="0"/>
           </a:p>
@@ -44369,7 +46705,7 @@
 </p:sld>
 </file>
 
-<file path=ppt/slides/slide39.xml><?xml version="1.0" encoding="utf-8"?>
+<file path=ppt/slides/slide43.xml><?xml version="1.0" encoding="utf-8"?>
 <p:sld xmlns:a="http://schemas.openxmlformats.org/drawingml/2006/main" xmlns:r="http://schemas.openxmlformats.org/officeDocument/2006/relationships" xmlns:p="http://schemas.openxmlformats.org/presentationml/2006/main">
   <p:cSld>
     <p:spTree>
@@ -44416,7 +46752,7 @@
             <a:fld id="{EF892D59-8F09-EF4B-AD6D-DA609442F868}" type="slidenum">
               <a:rPr lang="en-GB" smtClean="0"/>
               <a:pPr/>
-              <a:t>39</a:t>
+              <a:t>43</a:t>
             </a:fld>
             <a:endParaRPr lang="en-GB" dirty="0"/>
           </a:p>
@@ -44912,351 +47248,7 @@
 </p:sld>
 </file>
 
-<file path=ppt/slides/slide4.xml><?xml version="1.0" encoding="utf-8"?>
-<p:sld xmlns:a="http://schemas.openxmlformats.org/drawingml/2006/main" xmlns:r="http://schemas.openxmlformats.org/officeDocument/2006/relationships" xmlns:p="http://schemas.openxmlformats.org/presentationml/2006/main">
-  <p:cSld>
-    <p:spTree>
-      <p:nvGrpSpPr>
-        <p:cNvPr id="1" name=""/>
-        <p:cNvGrpSpPr/>
-        <p:nvPr/>
-      </p:nvGrpSpPr>
-      <p:grpSpPr>
-        <a:xfrm>
-          <a:off x="0" y="0"/>
-          <a:ext cx="0" cy="0"/>
-          <a:chOff x="0" y="0"/>
-          <a:chExt cx="0" cy="0"/>
-        </a:xfrm>
-      </p:grpSpPr>
-      <p:sp>
-        <p:nvSpPr>
-          <p:cNvPr id="2" name="Text Placeholder 1">
-            <a:extLst>
-              <a:ext uri="{FF2B5EF4-FFF2-40B4-BE49-F238E27FC236}">
-                <a16:creationId xmlns:a16="http://schemas.microsoft.com/office/drawing/2014/main" id="{6A65CFF8-8B9F-7508-C924-1B9C02A476E1}"/>
-              </a:ext>
-            </a:extLst>
-          </p:cNvPr>
-          <p:cNvSpPr>
-            <a:spLocks noGrp="1"/>
-          </p:cNvSpPr>
-          <p:nvPr>
-            <p:ph type="body" sz="quarter" idx="10"/>
-          </p:nvPr>
-        </p:nvSpPr>
-        <p:spPr>
-          <a:xfrm>
-            <a:off x="375629" y="2744921"/>
-            <a:ext cx="3694112" cy="730876"/>
-          </a:xfrm>
-        </p:spPr>
-        <p:txBody>
-          <a:bodyPr/>
-          <a:lstStyle/>
-          <a:p>
-            <a:r>
-              <a:rPr lang="en-GB" dirty="0"/>
-              <a:t>Recaps</a:t>
-            </a:r>
-          </a:p>
-        </p:txBody>
-      </p:sp>
-      <p:sp>
-        <p:nvSpPr>
-          <p:cNvPr id="4" name="Slide Number Placeholder 3">
-            <a:extLst>
-              <a:ext uri="{FF2B5EF4-FFF2-40B4-BE49-F238E27FC236}">
-                <a16:creationId xmlns:a16="http://schemas.microsoft.com/office/drawing/2014/main" id="{DEDA150B-8C2F-AC70-0E82-BD6B71D071CE}"/>
-              </a:ext>
-            </a:extLst>
-          </p:cNvPr>
-          <p:cNvSpPr>
-            <a:spLocks noGrp="1"/>
-          </p:cNvSpPr>
-          <p:nvPr>
-            <p:ph type="sldNum" sz="quarter" idx="4"/>
-          </p:nvPr>
-        </p:nvSpPr>
-        <p:spPr/>
-        <p:txBody>
-          <a:bodyPr/>
-          <a:lstStyle/>
-          <a:p>
-            <a:fld id="{EF892D59-8F09-EF4B-AD6D-DA609442F868}" type="slidenum">
-              <a:rPr lang="en-GB" smtClean="0"/>
-              <a:pPr/>
-              <a:t>4</a:t>
-            </a:fld>
-            <a:endParaRPr lang="en-GB" dirty="0"/>
-          </a:p>
-        </p:txBody>
-      </p:sp>
-      <p:sp>
-        <p:nvSpPr>
-          <p:cNvPr id="5" name="Text Placeholder 5">
-            <a:extLst>
-              <a:ext uri="{FF2B5EF4-FFF2-40B4-BE49-F238E27FC236}">
-                <a16:creationId xmlns:a16="http://schemas.microsoft.com/office/drawing/2014/main" id="{B27DF1F9-9AA4-AF42-EE90-C471C4AE44DF}"/>
-              </a:ext>
-            </a:extLst>
-          </p:cNvPr>
-          <p:cNvSpPr txBox="1">
-            <a:spLocks/>
-          </p:cNvSpPr>
-          <p:nvPr/>
-        </p:nvSpPr>
-        <p:spPr>
-          <a:xfrm>
-            <a:off x="5612701" y="494246"/>
-            <a:ext cx="6036461" cy="3007779"/>
-          </a:xfrm>
-          <a:prstGeom prst="rect">
-            <a:avLst/>
-          </a:prstGeom>
-        </p:spPr>
-        <p:txBody>
-          <a:bodyPr vert="horz" lIns="0" tIns="0" rIns="0" bIns="0" rtlCol="0" anchor="t" anchorCtr="0">
-            <a:noAutofit/>
-          </a:bodyPr>
-          <a:lstStyle>
-            <a:lvl1pPr marL="0" indent="0" algn="l" defTabSz="914400" rtl="0" eaLnBrk="1" latinLnBrk="0" hangingPunct="1">
-              <a:lnSpc>
-                <a:spcPct val="100000"/>
-              </a:lnSpc>
-              <a:spcBef>
-                <a:spcPts val="0"/>
-              </a:spcBef>
-              <a:spcAft>
-                <a:spcPts val="650"/>
-              </a:spcAft>
-              <a:buSzPct val="115000"/>
-              <a:buFont typeface="Arial" panose="020B0604020202020204" pitchFamily="34" charset="0"/>
-              <a:buNone/>
-              <a:defRPr sz="2000" b="0" i="0" kern="1200">
-                <a:solidFill>
-                  <a:schemeClr val="tx1"/>
-                </a:solidFill>
-                <a:latin typeface="Montserrat" pitchFamily="2" charset="77"/>
-                <a:ea typeface="+mn-ea"/>
-                <a:cs typeface="+mn-cs"/>
-              </a:defRPr>
-            </a:lvl1pPr>
-            <a:lvl2pPr marL="180000" marR="0" indent="-180000" algn="l" defTabSz="914400" rtl="0" eaLnBrk="1" fontAlgn="auto" latinLnBrk="0" hangingPunct="1">
-              <a:lnSpc>
-                <a:spcPct val="100000"/>
-              </a:lnSpc>
-              <a:spcBef>
-                <a:spcPts val="0"/>
-              </a:spcBef>
-              <a:spcAft>
-                <a:spcPts val="1200"/>
-              </a:spcAft>
-              <a:buClrTx/>
-              <a:buSzPct val="125000"/>
-              <a:buFont typeface="Arial" panose="020B0604020202020204" pitchFamily="34" charset="0"/>
-              <a:buChar char="•"/>
-              <a:tabLst/>
-              <a:defRPr sz="2000" b="0" kern="1200">
-                <a:solidFill>
-                  <a:schemeClr val="tx1"/>
-                </a:solidFill>
-                <a:latin typeface="Montserrat" pitchFamily="2" charset="77"/>
-                <a:ea typeface="+mn-ea"/>
-                <a:cs typeface="+mn-cs"/>
-              </a:defRPr>
-            </a:lvl2pPr>
-            <a:lvl3pPr marL="180000" indent="-180000" algn="l" defTabSz="914400" rtl="0" eaLnBrk="1" latinLnBrk="0" hangingPunct="1">
-              <a:lnSpc>
-                <a:spcPct val="100000"/>
-              </a:lnSpc>
-              <a:spcBef>
-                <a:spcPts val="0"/>
-              </a:spcBef>
-              <a:spcAft>
-                <a:spcPts val="650"/>
-              </a:spcAft>
-              <a:buSzPct val="120000"/>
-              <a:buFont typeface="Arial" panose="020B0604020202020204" pitchFamily="34" charset="0"/>
-              <a:buChar char="•"/>
-              <a:tabLst/>
-              <a:defRPr sz="2000" b="0" i="0" kern="1200">
-                <a:solidFill>
-                  <a:schemeClr val="tx1"/>
-                </a:solidFill>
-                <a:latin typeface="Montserrat" pitchFamily="2" charset="77"/>
-                <a:ea typeface="+mn-ea"/>
-                <a:cs typeface="+mn-cs"/>
-              </a:defRPr>
-            </a:lvl3pPr>
-            <a:lvl4pPr marL="180000" indent="-180000" algn="l" defTabSz="914400" rtl="0" eaLnBrk="1" latinLnBrk="0" hangingPunct="1">
-              <a:lnSpc>
-                <a:spcPct val="100000"/>
-              </a:lnSpc>
-              <a:spcBef>
-                <a:spcPts val="0"/>
-              </a:spcBef>
-              <a:spcAft>
-                <a:spcPts val="650"/>
-              </a:spcAft>
-              <a:buSzPct val="120000"/>
-              <a:buFont typeface="Arial" panose="020B0604020202020204" pitchFamily="34" charset="0"/>
-              <a:buChar char="•"/>
-              <a:tabLst/>
-              <a:defRPr sz="2000" b="0" kern="1200">
-                <a:solidFill>
-                  <a:schemeClr val="tx1"/>
-                </a:solidFill>
-                <a:latin typeface="Montserrat" pitchFamily="2" charset="77"/>
-                <a:ea typeface="+mn-ea"/>
-                <a:cs typeface="+mn-cs"/>
-              </a:defRPr>
-            </a:lvl4pPr>
-            <a:lvl5pPr marL="180000" indent="-180000" algn="l" defTabSz="914400" rtl="0" eaLnBrk="1" latinLnBrk="0" hangingPunct="1">
-              <a:lnSpc>
-                <a:spcPct val="100000"/>
-              </a:lnSpc>
-              <a:spcBef>
-                <a:spcPts val="0"/>
-              </a:spcBef>
-              <a:spcAft>
-                <a:spcPts val="650"/>
-              </a:spcAft>
-              <a:buSzPct val="125000"/>
-              <a:buFont typeface="Arial" panose="020B0604020202020204" pitchFamily="34" charset="0"/>
-              <a:buChar char="•"/>
-              <a:tabLst/>
-              <a:defRPr sz="2000" b="0" kern="1200">
-                <a:solidFill>
-                  <a:schemeClr val="tx1"/>
-                </a:solidFill>
-                <a:latin typeface="Montserrat" pitchFamily="2" charset="77"/>
-                <a:ea typeface="+mn-ea"/>
-                <a:cs typeface="+mn-cs"/>
-              </a:defRPr>
-            </a:lvl5pPr>
-            <a:lvl6pPr marL="2514600" indent="-228600" algn="l" defTabSz="914400" rtl="0" eaLnBrk="1" latinLnBrk="0" hangingPunct="1">
-              <a:lnSpc>
-                <a:spcPct val="90000"/>
-              </a:lnSpc>
-              <a:spcBef>
-                <a:spcPts val="500"/>
-              </a:spcBef>
-              <a:buFont typeface="Arial" panose="020B0604020202020204" pitchFamily="34" charset="0"/>
-              <a:buChar char="•"/>
-              <a:defRPr sz="1800" kern="1200">
-                <a:solidFill>
-                  <a:schemeClr val="tx1"/>
-                </a:solidFill>
-                <a:latin typeface="+mn-lt"/>
-                <a:ea typeface="+mn-ea"/>
-                <a:cs typeface="+mn-cs"/>
-              </a:defRPr>
-            </a:lvl6pPr>
-            <a:lvl7pPr marL="2971800" indent="-228600" algn="l" defTabSz="914400" rtl="0" eaLnBrk="1" latinLnBrk="0" hangingPunct="1">
-              <a:lnSpc>
-                <a:spcPct val="90000"/>
-              </a:lnSpc>
-              <a:spcBef>
-                <a:spcPts val="500"/>
-              </a:spcBef>
-              <a:buFont typeface="Arial" panose="020B0604020202020204" pitchFamily="34" charset="0"/>
-              <a:buChar char="•"/>
-              <a:defRPr sz="1800" kern="1200">
-                <a:solidFill>
-                  <a:schemeClr val="tx1"/>
-                </a:solidFill>
-                <a:latin typeface="+mn-lt"/>
-                <a:ea typeface="+mn-ea"/>
-                <a:cs typeface="+mn-cs"/>
-              </a:defRPr>
-            </a:lvl7pPr>
-            <a:lvl8pPr marL="3429000" indent="-228600" algn="l" defTabSz="914400" rtl="0" eaLnBrk="1" latinLnBrk="0" hangingPunct="1">
-              <a:lnSpc>
-                <a:spcPct val="90000"/>
-              </a:lnSpc>
-              <a:spcBef>
-                <a:spcPts val="500"/>
-              </a:spcBef>
-              <a:buFont typeface="Arial" panose="020B0604020202020204" pitchFamily="34" charset="0"/>
-              <a:buChar char="•"/>
-              <a:defRPr sz="1800" kern="1200">
-                <a:solidFill>
-                  <a:schemeClr val="tx1"/>
-                </a:solidFill>
-                <a:latin typeface="+mn-lt"/>
-                <a:ea typeface="+mn-ea"/>
-                <a:cs typeface="+mn-cs"/>
-              </a:defRPr>
-            </a:lvl8pPr>
-            <a:lvl9pPr marL="3886200" indent="-228600" algn="l" defTabSz="914400" rtl="0" eaLnBrk="1" latinLnBrk="0" hangingPunct="1">
-              <a:lnSpc>
-                <a:spcPct val="90000"/>
-              </a:lnSpc>
-              <a:spcBef>
-                <a:spcPts val="500"/>
-              </a:spcBef>
-              <a:buFont typeface="Arial" panose="020B0604020202020204" pitchFamily="34" charset="0"/>
-              <a:buChar char="•"/>
-              <a:defRPr sz="1800" kern="1200">
-                <a:solidFill>
-                  <a:schemeClr val="tx1"/>
-                </a:solidFill>
-                <a:latin typeface="+mn-lt"/>
-                <a:ea typeface="+mn-ea"/>
-                <a:cs typeface="+mn-cs"/>
-              </a:defRPr>
-            </a:lvl9pPr>
-          </a:lstStyle>
-          <a:p>
-            <a:r>
-              <a:rPr lang="en-GB" dirty="0"/>
-              <a:t>We would have looked at these throughout the course and you have all demonstrated good coding practice. </a:t>
-            </a:r>
-          </a:p>
-          <a:p>
-            <a:endParaRPr lang="en-GB" dirty="0"/>
-          </a:p>
-          <a:p>
-            <a:r>
-              <a:rPr lang="en-GB" dirty="0"/>
-              <a:t>Looking and identifying the good practice explicitly will help you understand why you have done what you have done, how you have done it</a:t>
-            </a:r>
-          </a:p>
-          <a:p>
-            <a:endParaRPr lang="en-GB" dirty="0"/>
-          </a:p>
-          <a:p>
-            <a:endParaRPr lang="en-GB" dirty="0"/>
-          </a:p>
-          <a:p>
-            <a:endParaRPr lang="en-GB" dirty="0"/>
-          </a:p>
-          <a:p>
-            <a:endParaRPr lang="en-GB" dirty="0"/>
-          </a:p>
-          <a:p>
-            <a:endParaRPr lang="en-GB" dirty="0"/>
-          </a:p>
-          <a:p>
-            <a:endParaRPr lang="en-GB" dirty="0"/>
-          </a:p>
-        </p:txBody>
-      </p:sp>
-    </p:spTree>
-    <p:extLst>
-      <p:ext uri="{BB962C8B-B14F-4D97-AF65-F5344CB8AC3E}">
-        <p14:creationId xmlns:p14="http://schemas.microsoft.com/office/powerpoint/2010/main" val="2037995151"/>
-      </p:ext>
-    </p:extLst>
-  </p:cSld>
-  <p:clrMapOvr>
-    <a:masterClrMapping/>
-  </p:clrMapOvr>
-</p:sld>
-</file>
-
-<file path=ppt/slides/slide40.xml><?xml version="1.0" encoding="utf-8"?>
+<file path=ppt/slides/slide44.xml><?xml version="1.0" encoding="utf-8"?>
 <p:sld xmlns:a="http://schemas.openxmlformats.org/drawingml/2006/main" xmlns:r="http://schemas.openxmlformats.org/officeDocument/2006/relationships" xmlns:p="http://schemas.openxmlformats.org/presentationml/2006/main">
   <p:cSld>
     <p:spTree>
@@ -45319,7 +47311,7 @@
 </p:sld>
 </file>
 
-<file path=ppt/slides/slide41.xml><?xml version="1.0" encoding="utf-8"?>
+<file path=ppt/slides/slide45.xml><?xml version="1.0" encoding="utf-8"?>
 <p:sld xmlns:a="http://schemas.openxmlformats.org/drawingml/2006/main" xmlns:r="http://schemas.openxmlformats.org/officeDocument/2006/relationships" xmlns:p="http://schemas.openxmlformats.org/presentationml/2006/main">
   <p:cSld>
     <p:spTree>
@@ -45459,7 +47451,7 @@
             <a:fld id="{EF892D59-8F09-EF4B-AD6D-DA609442F868}" type="slidenum">
               <a:rPr lang="en-GB" smtClean="0"/>
               <a:pPr/>
-              <a:t>41</a:t>
+              <a:t>45</a:t>
             </a:fld>
             <a:endParaRPr lang="en-GB" dirty="0"/>
           </a:p>
@@ -48908,6 +50900,26 @@
 </file>
 
 <file path=customXml/item1.xml><?xml version="1.0" encoding="utf-8"?>
+<p:properties xmlns:p="http://schemas.microsoft.com/office/2006/metadata/properties" xmlns:xsi="http://www.w3.org/2001/XMLSchema-instance" xmlns:pc="http://schemas.microsoft.com/office/infopath/2007/PartnerControls">
+  <documentManagement>
+    <TaxCatchAll xmlns="bd9f7b81-fce9-4f5e-8ca2-b74234fba64d" xsi:nil="true"/>
+    <lcf76f155ced4ddcb4097134ff3c332f xmlns="201905e2-e348-4925-9bf9-859ff66d3731">
+      <Terms xmlns="http://schemas.microsoft.com/office/infopath/2007/PartnerControls"/>
+    </lcf76f155ced4ddcb4097134ff3c332f>
+  </documentManagement>
+</p:properties>
+</file>
+
+<file path=customXml/item2.xml><?xml version="1.0" encoding="utf-8"?>
+<?mso-contentType ?>
+<FormTemplates xmlns="http://schemas.microsoft.com/sharepoint/v3/contenttype/forms">
+  <Display>DocumentLibraryForm</Display>
+  <Edit>DocumentLibraryForm</Edit>
+  <New>DocumentLibraryForm</New>
+</FormTemplates>
+</file>
+
+<file path=customXml/item3.xml><?xml version="1.0" encoding="utf-8"?>
 <ct:contentTypeSchema xmlns:ct="http://schemas.microsoft.com/office/2006/metadata/contentType" xmlns:ma="http://schemas.microsoft.com/office/2006/metadata/properties/metaAttributes" ct:_="" ma:_="" ma:contentTypeName="Document" ma:contentTypeID="0x010100F3467C10D74B2B4AB009A8AE58957B70" ma:contentTypeVersion="11" ma:contentTypeDescription="Create a new document." ma:contentTypeScope="" ma:versionID="5a954220bcc81bde48470b97c8d8107f">
   <xsd:schema xmlns:xsd="http://www.w3.org/2001/XMLSchema" xmlns:xs="http://www.w3.org/2001/XMLSchema" xmlns:p="http://schemas.microsoft.com/office/2006/metadata/properties" xmlns:ns2="201905e2-e348-4925-9bf9-859ff66d3731" xmlns:ns3="bd9f7b81-fce9-4f5e-8ca2-b74234fba64d" targetNamespace="http://schemas.microsoft.com/office/2006/metadata/properties" ma:root="true" ma:fieldsID="426082142d469ee0a66d8c0ced7a111b" ns2:_="" ns3:_="">
     <xsd:import namespace="201905e2-e348-4925-9bf9-859ff66d3731"/>
@@ -49118,46 +51130,7 @@
 </ct:contentTypeSchema>
 </file>
 
-<file path=customXml/item2.xml><?xml version="1.0" encoding="utf-8"?>
-<p:properties xmlns:p="http://schemas.microsoft.com/office/2006/metadata/properties" xmlns:xsi="http://www.w3.org/2001/XMLSchema-instance" xmlns:pc="http://schemas.microsoft.com/office/infopath/2007/PartnerControls">
-  <documentManagement>
-    <TaxCatchAll xmlns="bd9f7b81-fce9-4f5e-8ca2-b74234fba64d" xsi:nil="true"/>
-    <lcf76f155ced4ddcb4097134ff3c332f xmlns="201905e2-e348-4925-9bf9-859ff66d3731">
-      <Terms xmlns="http://schemas.microsoft.com/office/infopath/2007/PartnerControls"/>
-    </lcf76f155ced4ddcb4097134ff3c332f>
-  </documentManagement>
-</p:properties>
-</file>
-
-<file path=customXml/item3.xml><?xml version="1.0" encoding="utf-8"?>
-<?mso-contentType ?>
-<FormTemplates xmlns="http://schemas.microsoft.com/sharepoint/v3/contenttype/forms">
-  <Display>DocumentLibraryForm</Display>
-  <Edit>DocumentLibraryForm</Edit>
-  <New>DocumentLibraryForm</New>
-</FormTemplates>
-</file>
-
 <file path=customXml/itemProps1.xml><?xml version="1.0" encoding="utf-8"?>
-<ds:datastoreItem xmlns:ds="http://schemas.openxmlformats.org/officeDocument/2006/customXml" ds:itemID="{AA3A0C17-9FA8-46CF-BA9C-12C4AC339140}">
-  <ds:schemaRefs>
-    <ds:schemaRef ds:uri="http://schemas.microsoft.com/office/2006/metadata/contentType"/>
-    <ds:schemaRef ds:uri="http://schemas.microsoft.com/office/2006/metadata/properties/metaAttributes"/>
-    <ds:schemaRef ds:uri="http://www.w3.org/2001/XMLSchema"/>
-    <ds:schemaRef ds:uri="http://schemas.microsoft.com/office/2006/metadata/properties"/>
-    <ds:schemaRef ds:uri="201905e2-e348-4925-9bf9-859ff66d3731"/>
-    <ds:schemaRef ds:uri="bd9f7b81-fce9-4f5e-8ca2-b74234fba64d"/>
-    <ds:schemaRef ds:uri="http://schemas.microsoft.com/office/2006/documentManagement/types"/>
-    <ds:schemaRef ds:uri="http://schemas.microsoft.com/office/infopath/2007/PartnerControls"/>
-    <ds:schemaRef ds:uri="http://schemas.openxmlformats.org/package/2006/metadata/core-properties"/>
-    <ds:schemaRef ds:uri="http://purl.org/dc/elements/1.1/"/>
-    <ds:schemaRef ds:uri="http://purl.org/dc/terms/"/>
-    <ds:schemaRef ds:uri="http://schemas.microsoft.com/internal/obd"/>
-  </ds:schemaRefs>
-</ds:datastoreItem>
-</file>
-
-<file path=customXml/itemProps2.xml><?xml version="1.0" encoding="utf-8"?>
 <ds:datastoreItem xmlns:ds="http://schemas.openxmlformats.org/officeDocument/2006/customXml" ds:itemID="{43393610-D53F-4A84-8D42-34EBCB008255}">
   <ds:schemaRefs>
     <ds:schemaRef ds:uri="http://purl.org/dc/terms/"/>
@@ -49177,10 +51150,29 @@
 </ds:datastoreItem>
 </file>
 
-<file path=customXml/itemProps3.xml><?xml version="1.0" encoding="utf-8"?>
+<file path=customXml/itemProps2.xml><?xml version="1.0" encoding="utf-8"?>
 <ds:datastoreItem xmlns:ds="http://schemas.openxmlformats.org/officeDocument/2006/customXml" ds:itemID="{25B3E867-B45B-49B9-9F16-ACF80FBBDAA6}">
   <ds:schemaRefs>
     <ds:schemaRef ds:uri="http://schemas.microsoft.com/sharepoint/v3/contenttype/forms"/>
   </ds:schemaRefs>
 </ds:datastoreItem>
+</file>
+
+<file path=customXml/itemProps3.xml><?xml version="1.0" encoding="utf-8"?>
+<ds:datastoreItem xmlns:ds="http://schemas.openxmlformats.org/officeDocument/2006/customXml" ds:itemID="{AA3A0C17-9FA8-46CF-BA9C-12C4AC339140}">
+  <ds:schemaRefs>
+    <ds:schemaRef ds:uri="http://schemas.microsoft.com/office/2006/metadata/contentType"/>
+    <ds:schemaRef ds:uri="http://schemas.microsoft.com/office/2006/metadata/properties/metaAttributes"/>
+    <ds:schemaRef ds:uri="http://www.w3.org/2001/XMLSchema"/>
+    <ds:schemaRef ds:uri="http://schemas.microsoft.com/office/2006/metadata/properties"/>
+    <ds:schemaRef ds:uri="201905e2-e348-4925-9bf9-859ff66d3731"/>
+    <ds:schemaRef ds:uri="bd9f7b81-fce9-4f5e-8ca2-b74234fba64d"/>
+    <ds:schemaRef ds:uri="http://schemas.microsoft.com/office/2006/documentManagement/types"/>
+    <ds:schemaRef ds:uri="http://schemas.microsoft.com/office/infopath/2007/PartnerControls"/>
+    <ds:schemaRef ds:uri="http://schemas.openxmlformats.org/package/2006/metadata/core-properties"/>
+    <ds:schemaRef ds:uri="http://purl.org/dc/elements/1.1/"/>
+    <ds:schemaRef ds:uri="http://purl.org/dc/terms/"/>
+    <ds:schemaRef ds:uri="http://schemas.microsoft.com/internal/obd"/>
+  </ds:schemaRefs>
+</ds:datastoreItem>
 </file>
</xml_diff>